<commit_message>
added a presentation note
</commit_message>
<xml_diff>
--- a/Luther_presentation.pptx
+++ b/Luther_presentation.pptx
@@ -476,6 +476,98 @@
 </file>
 
 <file path=ppt/notesSlides/notesSlide1.xml><?xml version="1.0" encoding="utf-8"?>
+<p:notes xmlns:a="http://schemas.openxmlformats.org/drawingml/2006/main" xmlns:r="http://schemas.openxmlformats.org/officeDocument/2006/relationships" xmlns:p="http://schemas.openxmlformats.org/presentationml/2006/main">
+  <p:cSld>
+    <p:spTree>
+      <p:nvGrpSpPr>
+        <p:cNvPr id="1" name=""/>
+        <p:cNvGrpSpPr/>
+        <p:nvPr/>
+      </p:nvGrpSpPr>
+      <p:grpSpPr>
+        <a:xfrm>
+          <a:off x="0" y="0"/>
+          <a:ext cx="0" cy="0"/>
+          <a:chOff x="0" y="0"/>
+          <a:chExt cx="0" cy="0"/>
+        </a:xfrm>
+      </p:grpSpPr>
+      <p:sp>
+        <p:nvSpPr>
+          <p:cNvPr id="2" name="Slide Image Placeholder 1"/>
+          <p:cNvSpPr>
+            <a:spLocks noGrp="1" noRot="1" noChangeAspect="1"/>
+          </p:cNvSpPr>
+          <p:nvPr>
+            <p:ph type="sldImg"/>
+          </p:nvPr>
+        </p:nvSpPr>
+        <p:spPr/>
+      </p:sp>
+      <p:sp>
+        <p:nvSpPr>
+          <p:cNvPr id="3" name="Notes Placeholder 2"/>
+          <p:cNvSpPr>
+            <a:spLocks noGrp="1"/>
+          </p:cNvSpPr>
+          <p:nvPr>
+            <p:ph type="body" idx="1"/>
+          </p:nvPr>
+        </p:nvSpPr>
+        <p:spPr/>
+        <p:txBody>
+          <a:bodyPr/>
+          <a:lstStyle/>
+          <a:p>
+            <a:r>
+              <a:rPr lang="en-US" dirty="0" smtClean="0"/>
+              <a:t>GBR trees --</a:t>
+            </a:r>
+            <a:r>
+              <a:rPr lang="en-US" baseline="0" dirty="0" smtClean="0"/>
+              <a:t> trees learn from the errors of its predecessors. </a:t>
+            </a:r>
+            <a:endParaRPr lang="en-US" dirty="0"/>
+          </a:p>
+        </p:txBody>
+      </p:sp>
+      <p:sp>
+        <p:nvSpPr>
+          <p:cNvPr id="4" name="Slide Number Placeholder 3"/>
+          <p:cNvSpPr>
+            <a:spLocks noGrp="1"/>
+          </p:cNvSpPr>
+          <p:nvPr>
+            <p:ph type="sldNum" sz="quarter" idx="10"/>
+          </p:nvPr>
+        </p:nvSpPr>
+        <p:spPr/>
+        <p:txBody>
+          <a:bodyPr/>
+          <a:lstStyle/>
+          <a:p>
+            <a:fld id="{B92ECC9D-7602-574E-8697-BE4A00334BB3}" type="slidenum">
+              <a:rPr lang="en-US" smtClean="0"/>
+              <a:t>3</a:t>
+            </a:fld>
+            <a:endParaRPr lang="en-US"/>
+          </a:p>
+        </p:txBody>
+      </p:sp>
+    </p:spTree>
+    <p:extLst>
+      <p:ext uri="{BB962C8B-B14F-4D97-AF65-F5344CB8AC3E}">
+        <p14:creationId xmlns:p14="http://schemas.microsoft.com/office/powerpoint/2010/main" val="4214501887"/>
+      </p:ext>
+    </p:extLst>
+  </p:cSld>
+  <p:clrMapOvr>
+    <a:masterClrMapping/>
+  </p:clrMapOvr>
+</p:notes>
+</file>
+
+<file path=ppt/notesSlides/notesSlide2.xml><?xml version="1.0" encoding="utf-8"?>
 <p:notes xmlns:a="http://schemas.openxmlformats.org/drawingml/2006/main" xmlns:r="http://schemas.openxmlformats.org/officeDocument/2006/relationships" xmlns:p="http://schemas.openxmlformats.org/presentationml/2006/main">
   <p:cSld>
     <p:spTree>
@@ -4742,7 +4834,7 @@
           <p:nvPr/>
         </p:nvPicPr>
         <p:blipFill>
-          <a:blip r:embed="rId2">
+          <a:blip r:embed="rId3">
             <a:extLst>
               <a:ext uri="{28A0092B-C50C-407E-A947-70E740481C1C}">
                 <a14:useLocalDpi xmlns:a14="http://schemas.microsoft.com/office/drawing/2010/main" val="0"/>
@@ -5094,7 +5186,37 @@
                 <a:latin typeface="Avenir Black"/>
                 <a:cs typeface="Avenir Black"/>
               </a:rPr>
-              <a:t>Gradient Boosted Regression Tree model</a:t>
+              <a:t>Gradient-Boosted </a:t>
+            </a:r>
+            <a:r>
+              <a:rPr lang="en-US" sz="3200" dirty="0" smtClean="0">
+                <a:solidFill>
+                  <a:srgbClr val="660066"/>
+                </a:solidFill>
+                <a:latin typeface="Avenir Black"/>
+                <a:cs typeface="Avenir Black"/>
+              </a:rPr>
+              <a:t>Regression </a:t>
+            </a:r>
+            <a:r>
+              <a:rPr lang="en-US" sz="3200" dirty="0" smtClean="0">
+                <a:solidFill>
+                  <a:srgbClr val="660066"/>
+                </a:solidFill>
+                <a:latin typeface="Avenir Black"/>
+                <a:cs typeface="Avenir Black"/>
+              </a:rPr>
+              <a:t>Trees </a:t>
+            </a:r>
+            <a:r>
+              <a:rPr lang="en-US" sz="3200" dirty="0" smtClean="0">
+                <a:solidFill>
+                  <a:srgbClr val="660066"/>
+                </a:solidFill>
+                <a:latin typeface="Avenir Black"/>
+                <a:cs typeface="Avenir Black"/>
+              </a:rPr>
+              <a:t>model</a:t>
             </a:r>
           </a:p>
         </p:txBody>

</xml_diff>

<commit_message>
Added Luther presentation update
</commit_message>
<xml_diff>
--- a/Luther_presentation.pptx
+++ b/Luther_presentation.pptx
@@ -5,27 +5,26 @@
     <p:sldMasterId id="2147483648" r:id="rId1"/>
   </p:sldMasterIdLst>
   <p:notesMasterIdLst>
-    <p:notesMasterId r:id="rId20"/>
+    <p:notesMasterId r:id="rId19"/>
   </p:notesMasterIdLst>
   <p:sldIdLst>
     <p:sldId id="256" r:id="rId2"/>
     <p:sldId id="260" r:id="rId3"/>
     <p:sldId id="264" r:id="rId4"/>
-    <p:sldId id="263" r:id="rId5"/>
-    <p:sldId id="272" r:id="rId6"/>
-    <p:sldId id="261" r:id="rId7"/>
-    <p:sldId id="265" r:id="rId8"/>
-    <p:sldId id="266" r:id="rId9"/>
-    <p:sldId id="267" r:id="rId10"/>
-    <p:sldId id="268" r:id="rId11"/>
-    <p:sldId id="259" r:id="rId12"/>
-    <p:sldId id="274" r:id="rId13"/>
-    <p:sldId id="273" r:id="rId14"/>
-    <p:sldId id="269" r:id="rId15"/>
-    <p:sldId id="258" r:id="rId16"/>
-    <p:sldId id="271" r:id="rId17"/>
-    <p:sldId id="270" r:id="rId18"/>
-    <p:sldId id="262" r:id="rId19"/>
+    <p:sldId id="267" r:id="rId5"/>
+    <p:sldId id="259" r:id="rId6"/>
+    <p:sldId id="273" r:id="rId7"/>
+    <p:sldId id="269" r:id="rId8"/>
+    <p:sldId id="263" r:id="rId9"/>
+    <p:sldId id="275" r:id="rId10"/>
+    <p:sldId id="272" r:id="rId11"/>
+    <p:sldId id="261" r:id="rId12"/>
+    <p:sldId id="265" r:id="rId13"/>
+    <p:sldId id="266" r:id="rId14"/>
+    <p:sldId id="268" r:id="rId15"/>
+    <p:sldId id="274" r:id="rId16"/>
+    <p:sldId id="258" r:id="rId17"/>
+    <p:sldId id="262" r:id="rId18"/>
   </p:sldIdLst>
   <p:sldSz cx="9144000" cy="6858000" type="screen4x3"/>
   <p:notesSz cx="6858000" cy="9144000"/>
@@ -521,14 +520,106 @@
           <a:bodyPr/>
           <a:lstStyle/>
           <a:p>
-            <a:r>
-              <a:rPr lang="en-US" dirty="0" smtClean="0"/>
-              <a:t>GBR trees --</a:t>
-            </a:r>
-            <a:r>
-              <a:rPr lang="en-US" baseline="0" dirty="0" smtClean="0"/>
-              <a:t> trees learn from the errors of its predecessors. </a:t>
-            </a:r>
+            <a:pPr marL="0" marR="0" indent="0" algn="l" defTabSz="457200" rtl="0" eaLnBrk="1" fontAlgn="auto" latinLnBrk="0" hangingPunct="1">
+              <a:lnSpc>
+                <a:spcPct val="100000"/>
+              </a:lnSpc>
+              <a:spcBef>
+                <a:spcPts val="0"/>
+              </a:spcBef>
+              <a:spcAft>
+                <a:spcPts val="0"/>
+              </a:spcAft>
+              <a:buClrTx/>
+              <a:buSzTx/>
+              <a:buFontTx/>
+              <a:buNone/>
+              <a:tabLst/>
+              <a:defRPr/>
+            </a:pPr>
+            <a:r>
+              <a:rPr lang="en-US" sz="1200" dirty="0" smtClean="0">
+                <a:latin typeface="Avenir Black"/>
+                <a:cs typeface="Avenir Black"/>
+              </a:rPr>
+              <a:t>What kinds of actors have high widest theater release #s? </a:t>
+            </a:r>
+          </a:p>
+          <a:p>
+            <a:pPr marL="0" marR="0" indent="0" algn="l" defTabSz="457200" rtl="0" eaLnBrk="1" fontAlgn="auto" latinLnBrk="0" hangingPunct="1">
+              <a:lnSpc>
+                <a:spcPct val="100000"/>
+              </a:lnSpc>
+              <a:spcBef>
+                <a:spcPts val="0"/>
+              </a:spcBef>
+              <a:spcAft>
+                <a:spcPts val="0"/>
+              </a:spcAft>
+              <a:buClrTx/>
+              <a:buSzTx/>
+              <a:buFontTx/>
+              <a:buNone/>
+              <a:tabLst/>
+              <a:defRPr/>
+            </a:pPr>
+            <a:endParaRPr lang="en-US" sz="1200" dirty="0" smtClean="0">
+              <a:latin typeface="Avenir Black"/>
+              <a:cs typeface="Avenir Black"/>
+            </a:endParaRPr>
+          </a:p>
+          <a:p>
+            <a:pPr marL="0" marR="0" indent="0" algn="l" defTabSz="457200" rtl="0" eaLnBrk="1" fontAlgn="auto" latinLnBrk="0" hangingPunct="1">
+              <a:lnSpc>
+                <a:spcPct val="100000"/>
+              </a:lnSpc>
+              <a:spcBef>
+                <a:spcPts val="0"/>
+              </a:spcBef>
+              <a:spcAft>
+                <a:spcPts val="0"/>
+              </a:spcAft>
+              <a:buClrTx/>
+              <a:buSzTx/>
+              <a:buFontTx/>
+              <a:buNone/>
+              <a:tabLst/>
+              <a:defRPr/>
+            </a:pPr>
+            <a:r>
+              <a:rPr lang="en-US" sz="1200" dirty="0" smtClean="0">
+                <a:latin typeface="Avenir Black"/>
+                <a:cs typeface="Avenir Black"/>
+              </a:rPr>
+              <a:t>What predicts</a:t>
+            </a:r>
+            <a:r>
+              <a:rPr lang="en-US" sz="1200" baseline="0" dirty="0" smtClean="0">
+                <a:latin typeface="Avenir Black"/>
+                <a:cs typeface="Avenir Black"/>
+              </a:rPr>
+              <a:t> an actor’s </a:t>
+            </a:r>
+            <a:r>
+              <a:rPr lang="en-US" sz="1200" baseline="0" dirty="0" err="1" smtClean="0">
+                <a:latin typeface="Avenir Black"/>
+                <a:cs typeface="Avenir Black"/>
+              </a:rPr>
+              <a:t>avg</a:t>
+            </a:r>
+            <a:r>
+              <a:rPr lang="en-US" sz="1200" baseline="0" dirty="0" smtClean="0">
+                <a:latin typeface="Avenir Black"/>
+                <a:cs typeface="Avenir Black"/>
+              </a:rPr>
+              <a:t> widest release?</a:t>
+            </a:r>
+            <a:endParaRPr lang="en-US" sz="1200" dirty="0" smtClean="0">
+              <a:latin typeface="Avenir Black"/>
+              <a:cs typeface="Avenir Black"/>
+            </a:endParaRPr>
+          </a:p>
+          <a:p>
             <a:endParaRPr lang="en-US" dirty="0"/>
           </a:p>
         </p:txBody>
@@ -550,7 +641,7 @@
           <a:p>
             <a:fld id="{B92ECC9D-7602-574E-8697-BE4A00334BB3}" type="slidenum">
               <a:rPr lang="en-US" smtClean="0"/>
-              <a:t>3</a:t>
+              <a:t>2</a:t>
             </a:fld>
             <a:endParaRPr lang="en-US"/>
           </a:p>
@@ -559,7 +650,7 @@
     </p:spTree>
     <p:extLst>
       <p:ext uri="{BB962C8B-B14F-4D97-AF65-F5344CB8AC3E}">
-        <p14:creationId xmlns:p14="http://schemas.microsoft.com/office/powerpoint/2010/main" val="4214501887"/>
+        <p14:creationId xmlns:p14="http://schemas.microsoft.com/office/powerpoint/2010/main" val="1223545959"/>
       </p:ext>
     </p:extLst>
   </p:cSld>
@@ -615,11 +706,29 @@
           <a:p>
             <a:r>
               <a:rPr lang="en-US" dirty="0" smtClean="0"/>
-              <a:t>For future work:</a:t>
+              <a:t>1990 films onwards</a:t>
+            </a:r>
+          </a:p>
+          <a:p>
+            <a:endParaRPr lang="en-US" dirty="0" smtClean="0"/>
+          </a:p>
+          <a:p>
+            <a:r>
+              <a:rPr lang="en-US" dirty="0" smtClean="0"/>
+              <a:t>Roughly 2500 actors</a:t>
+            </a:r>
+          </a:p>
+          <a:p>
+            <a:endParaRPr lang="en-US" dirty="0" smtClean="0"/>
+          </a:p>
+          <a:p>
+            <a:r>
+              <a:rPr lang="en-US" dirty="0" smtClean="0"/>
+              <a:t>Dropped actors whose</a:t>
             </a:r>
             <a:r>
               <a:rPr lang="en-US" baseline="0" dirty="0" smtClean="0"/>
-              <a:t> it might be useful to ignore actors with less than a given number of movies and run the model again without considering </a:t>
+              <a:t> </a:t>
             </a:r>
             <a:r>
               <a:rPr lang="en-US" baseline="0" dirty="0" err="1" smtClean="0"/>
@@ -627,7 +736,7 @@
             </a:r>
             <a:r>
               <a:rPr lang="en-US" baseline="0" dirty="0" smtClean="0"/>
-              <a:t> domestic gross. </a:t>
+              <a:t> runtime was &gt; 200 </a:t>
             </a:r>
             <a:endParaRPr lang="en-US" dirty="0"/>
           </a:p>
@@ -650,7 +759,7 @@
           <a:p>
             <a:fld id="{B92ECC9D-7602-574E-8697-BE4A00334BB3}" type="slidenum">
               <a:rPr lang="en-US" smtClean="0"/>
-              <a:t>4</a:t>
+              <a:t>3</a:t>
             </a:fld>
             <a:endParaRPr lang="en-US"/>
           </a:p>
@@ -659,7 +768,7 @@
     </p:spTree>
     <p:extLst>
       <p:ext uri="{BB962C8B-B14F-4D97-AF65-F5344CB8AC3E}">
-        <p14:creationId xmlns:p14="http://schemas.microsoft.com/office/powerpoint/2010/main" val="3928219638"/>
+        <p14:creationId xmlns:p14="http://schemas.microsoft.com/office/powerpoint/2010/main" val="4214501887"/>
       </p:ext>
     </p:extLst>
   </p:cSld>
@@ -713,15 +822,10 @@
           <a:bodyPr/>
           <a:lstStyle/>
           <a:p>
-            <a:r>
-              <a:rPr lang="en-US" dirty="0" smtClean="0"/>
-              <a:t>Budget and Domestic</a:t>
-            </a:r>
-            <a:r>
-              <a:rPr lang="en-US" baseline="0" dirty="0" smtClean="0"/>
-              <a:t> gross</a:t>
-            </a:r>
-            <a:endParaRPr lang="en-US" dirty="0"/>
+            <a:endParaRPr lang="en-US" sz="4000" dirty="0">
+              <a:latin typeface="Avenir Black"/>
+              <a:cs typeface="Avenir Black"/>
+            </a:endParaRPr>
           </a:p>
         </p:txBody>
       </p:sp>
@@ -742,7 +846,7 @@
           <a:p>
             <a:fld id="{B92ECC9D-7602-574E-8697-BE4A00334BB3}" type="slidenum">
               <a:rPr lang="en-US" smtClean="0"/>
-              <a:t>7</a:t>
+              <a:t>4</a:t>
             </a:fld>
             <a:endParaRPr lang="en-US"/>
           </a:p>
@@ -751,7 +855,7 @@
     </p:spTree>
     <p:extLst>
       <p:ext uri="{BB962C8B-B14F-4D97-AF65-F5344CB8AC3E}">
-        <p14:creationId xmlns:p14="http://schemas.microsoft.com/office/powerpoint/2010/main" val="3780636325"/>
+        <p14:creationId xmlns:p14="http://schemas.microsoft.com/office/powerpoint/2010/main" val="2859582697"/>
       </p:ext>
     </p:extLst>
   </p:cSld>
@@ -805,38 +909,7 @@
           <a:bodyPr/>
           <a:lstStyle/>
           <a:p>
-            <a:r>
-              <a:rPr lang="en-US" sz="4000" dirty="0" smtClean="0">
-                <a:latin typeface="Avenir Black"/>
-                <a:cs typeface="Avenir Black"/>
-              </a:rPr>
-              <a:t>SIZE</a:t>
-            </a:r>
-            <a:r>
-              <a:rPr lang="en-US" sz="4000" baseline="0" dirty="0" smtClean="0">
-                <a:latin typeface="Avenir Black"/>
-                <a:cs typeface="Avenir Black"/>
-              </a:rPr>
-              <a:t> OF DOTS </a:t>
-            </a:r>
-            <a:r>
-              <a:rPr lang="mr-IN" sz="4000" baseline="0" dirty="0" smtClean="0">
-                <a:latin typeface="Avenir Black"/>
-                <a:cs typeface="Avenir Black"/>
-              </a:rPr>
-              <a:t>–</a:t>
-            </a:r>
-            <a:r>
-              <a:rPr lang="en-US" sz="4000" baseline="0" dirty="0" smtClean="0">
-                <a:latin typeface="Avenir Black"/>
-                <a:cs typeface="Avenir Black"/>
-              </a:rPr>
-              <a:t> MOVIE COUNTS?</a:t>
-            </a:r>
-            <a:endParaRPr lang="en-US" sz="4000" dirty="0">
-              <a:latin typeface="Avenir Black"/>
-              <a:cs typeface="Avenir Black"/>
-            </a:endParaRPr>
+            <a:endParaRPr lang="en-US" dirty="0"/>
           </a:p>
         </p:txBody>
       </p:sp>
@@ -857,7 +930,7 @@
           <a:p>
             <a:fld id="{B92ECC9D-7602-574E-8697-BE4A00334BB3}" type="slidenum">
               <a:rPr lang="en-US" smtClean="0"/>
-              <a:t>9</a:t>
+              <a:t>5</a:t>
             </a:fld>
             <a:endParaRPr lang="en-US"/>
           </a:p>
@@ -866,7 +939,199 @@
     </p:spTree>
     <p:extLst>
       <p:ext uri="{BB962C8B-B14F-4D97-AF65-F5344CB8AC3E}">
-        <p14:creationId xmlns:p14="http://schemas.microsoft.com/office/powerpoint/2010/main" val="2859582697"/>
+        <p14:creationId xmlns:p14="http://schemas.microsoft.com/office/powerpoint/2010/main" val="1107032546"/>
+      </p:ext>
+    </p:extLst>
+  </p:cSld>
+  <p:clrMapOvr>
+    <a:masterClrMapping/>
+  </p:clrMapOvr>
+</p:notes>
+</file>
+
+<file path=ppt/notesSlides/notesSlide5.xml><?xml version="1.0" encoding="utf-8"?>
+<p:notes xmlns:a="http://schemas.openxmlformats.org/drawingml/2006/main" xmlns:r="http://schemas.openxmlformats.org/officeDocument/2006/relationships" xmlns:p="http://schemas.openxmlformats.org/presentationml/2006/main">
+  <p:cSld>
+    <p:spTree>
+      <p:nvGrpSpPr>
+        <p:cNvPr id="1" name=""/>
+        <p:cNvGrpSpPr/>
+        <p:nvPr/>
+      </p:nvGrpSpPr>
+      <p:grpSpPr>
+        <a:xfrm>
+          <a:off x="0" y="0"/>
+          <a:ext cx="0" cy="0"/>
+          <a:chOff x="0" y="0"/>
+          <a:chExt cx="0" cy="0"/>
+        </a:xfrm>
+      </p:grpSpPr>
+      <p:sp>
+        <p:nvSpPr>
+          <p:cNvPr id="2" name="Slide Image Placeholder 1"/>
+          <p:cNvSpPr>
+            <a:spLocks noGrp="1" noRot="1" noChangeAspect="1"/>
+          </p:cNvSpPr>
+          <p:nvPr>
+            <p:ph type="sldImg"/>
+          </p:nvPr>
+        </p:nvSpPr>
+        <p:spPr/>
+      </p:sp>
+      <p:sp>
+        <p:nvSpPr>
+          <p:cNvPr id="3" name="Notes Placeholder 2"/>
+          <p:cNvSpPr>
+            <a:spLocks noGrp="1"/>
+          </p:cNvSpPr>
+          <p:nvPr>
+            <p:ph type="body" idx="1"/>
+          </p:nvPr>
+        </p:nvSpPr>
+        <p:spPr/>
+        <p:txBody>
+          <a:bodyPr/>
+          <a:lstStyle/>
+          <a:p>
+            <a:r>
+              <a:rPr lang="en-US" sz="2000" dirty="0" smtClean="0"/>
+              <a:t>For future work:</a:t>
+            </a:r>
+            <a:r>
+              <a:rPr lang="en-US" sz="2000" baseline="0" dirty="0" smtClean="0"/>
+              <a:t> it might be useful to ignore actors with less than a given number of movies and run the model again without considering </a:t>
+            </a:r>
+            <a:r>
+              <a:rPr lang="en-US" sz="2000" baseline="0" dirty="0" err="1" smtClean="0"/>
+              <a:t>avg</a:t>
+            </a:r>
+            <a:r>
+              <a:rPr lang="en-US" sz="2000" baseline="0" dirty="0" smtClean="0"/>
+              <a:t> domestic gross. </a:t>
+            </a:r>
+            <a:endParaRPr lang="en-US" sz="2000" dirty="0"/>
+          </a:p>
+        </p:txBody>
+      </p:sp>
+      <p:sp>
+        <p:nvSpPr>
+          <p:cNvPr id="4" name="Slide Number Placeholder 3"/>
+          <p:cNvSpPr>
+            <a:spLocks noGrp="1"/>
+          </p:cNvSpPr>
+          <p:nvPr>
+            <p:ph type="sldNum" sz="quarter" idx="10"/>
+          </p:nvPr>
+        </p:nvSpPr>
+        <p:spPr/>
+        <p:txBody>
+          <a:bodyPr/>
+          <a:lstStyle/>
+          <a:p>
+            <a:fld id="{B92ECC9D-7602-574E-8697-BE4A00334BB3}" type="slidenum">
+              <a:rPr lang="en-US" smtClean="0"/>
+              <a:t>8</a:t>
+            </a:fld>
+            <a:endParaRPr lang="en-US"/>
+          </a:p>
+        </p:txBody>
+      </p:sp>
+    </p:spTree>
+    <p:extLst>
+      <p:ext uri="{BB962C8B-B14F-4D97-AF65-F5344CB8AC3E}">
+        <p14:creationId xmlns:p14="http://schemas.microsoft.com/office/powerpoint/2010/main" val="3928219638"/>
+      </p:ext>
+    </p:extLst>
+  </p:cSld>
+  <p:clrMapOvr>
+    <a:masterClrMapping/>
+  </p:clrMapOvr>
+</p:notes>
+</file>
+
+<file path=ppt/notesSlides/notesSlide6.xml><?xml version="1.0" encoding="utf-8"?>
+<p:notes xmlns:a="http://schemas.openxmlformats.org/drawingml/2006/main" xmlns:r="http://schemas.openxmlformats.org/officeDocument/2006/relationships" xmlns:p="http://schemas.openxmlformats.org/presentationml/2006/main">
+  <p:cSld>
+    <p:spTree>
+      <p:nvGrpSpPr>
+        <p:cNvPr id="1" name=""/>
+        <p:cNvGrpSpPr/>
+        <p:nvPr/>
+      </p:nvGrpSpPr>
+      <p:grpSpPr>
+        <a:xfrm>
+          <a:off x="0" y="0"/>
+          <a:ext cx="0" cy="0"/>
+          <a:chOff x="0" y="0"/>
+          <a:chExt cx="0" cy="0"/>
+        </a:xfrm>
+      </p:grpSpPr>
+      <p:sp>
+        <p:nvSpPr>
+          <p:cNvPr id="2" name="Slide Image Placeholder 1"/>
+          <p:cNvSpPr>
+            <a:spLocks noGrp="1" noRot="1" noChangeAspect="1"/>
+          </p:cNvSpPr>
+          <p:nvPr>
+            <p:ph type="sldImg"/>
+          </p:nvPr>
+        </p:nvSpPr>
+        <p:spPr/>
+      </p:sp>
+      <p:sp>
+        <p:nvSpPr>
+          <p:cNvPr id="3" name="Notes Placeholder 2"/>
+          <p:cNvSpPr>
+            <a:spLocks noGrp="1"/>
+          </p:cNvSpPr>
+          <p:nvPr>
+            <p:ph type="body" idx="1"/>
+          </p:nvPr>
+        </p:nvSpPr>
+        <p:spPr/>
+        <p:txBody>
+          <a:bodyPr/>
+          <a:lstStyle/>
+          <a:p>
+            <a:r>
+              <a:rPr lang="en-US" dirty="0" smtClean="0"/>
+              <a:t>Budget and Domestic</a:t>
+            </a:r>
+            <a:r>
+              <a:rPr lang="en-US" baseline="0" dirty="0" smtClean="0"/>
+              <a:t> gross</a:t>
+            </a:r>
+            <a:endParaRPr lang="en-US" dirty="0"/>
+          </a:p>
+        </p:txBody>
+      </p:sp>
+      <p:sp>
+        <p:nvSpPr>
+          <p:cNvPr id="4" name="Slide Number Placeholder 3"/>
+          <p:cNvSpPr>
+            <a:spLocks noGrp="1"/>
+          </p:cNvSpPr>
+          <p:nvPr>
+            <p:ph type="sldNum" sz="quarter" idx="10"/>
+          </p:nvPr>
+        </p:nvSpPr>
+        <p:spPr/>
+        <p:txBody>
+          <a:bodyPr/>
+          <a:lstStyle/>
+          <a:p>
+            <a:fld id="{B92ECC9D-7602-574E-8697-BE4A00334BB3}" type="slidenum">
+              <a:rPr lang="en-US" smtClean="0"/>
+              <a:t>12</a:t>
+            </a:fld>
+            <a:endParaRPr lang="en-US"/>
+          </a:p>
+        </p:txBody>
+      </p:sp>
+    </p:spTree>
+    <p:extLst>
+      <p:ext uri="{BB962C8B-B14F-4D97-AF65-F5344CB8AC3E}">
+        <p14:creationId xmlns:p14="http://schemas.microsoft.com/office/powerpoint/2010/main" val="3780636325"/>
       </p:ext>
     </p:extLst>
   </p:cSld>
@@ -3880,8 +4145,8 @@
         </p:nvSpPr>
         <p:spPr>
           <a:xfrm>
-            <a:off x="396007" y="2150240"/>
-            <a:ext cx="8343452" cy="3785652"/>
+            <a:off x="512794" y="1259686"/>
+            <a:ext cx="8343452" cy="4955203"/>
           </a:xfrm>
           <a:prstGeom prst="rect">
             <a:avLst/>
@@ -3893,35 +4158,56 @@
           </a:bodyPr>
           <a:lstStyle/>
           <a:p>
-            <a:r>
-              <a:rPr lang="en-US" sz="6000" dirty="0" smtClean="0">
+            <a:pPr algn="ctr"/>
+            <a:r>
+              <a:rPr lang="en-US" sz="4400" dirty="0" smtClean="0">
                 <a:latin typeface="Avenir Black"/>
                 <a:cs typeface="Avenir Black"/>
               </a:rPr>
-              <a:t>PROJECT LUTHER</a:t>
-            </a:r>
-          </a:p>
-          <a:p>
-            <a:endParaRPr lang="en-US" sz="3600" dirty="0">
+              <a:t>Project Luther</a:t>
+            </a:r>
+            <a:endParaRPr lang="en-US" sz="4400" dirty="0">
               <a:latin typeface="Avenir Black"/>
               <a:cs typeface="Avenir Black"/>
             </a:endParaRPr>
           </a:p>
           <a:p>
+            <a:pPr algn="ctr"/>
             <a:endParaRPr lang="en-US" sz="3600" dirty="0" smtClean="0">
               <a:latin typeface="Avenir Book"/>
               <a:cs typeface="Avenir Book"/>
             </a:endParaRPr>
           </a:p>
           <a:p>
-            <a:pPr algn="r"/>
+            <a:pPr algn="ctr"/>
             <a:endParaRPr lang="en-US" sz="3600" i="1" dirty="0" smtClean="0">
               <a:latin typeface="Avenir Book"/>
               <a:cs typeface="Avenir Book"/>
             </a:endParaRPr>
           </a:p>
           <a:p>
-            <a:pPr algn="r"/>
+            <a:pPr algn="ctr"/>
+            <a:endParaRPr lang="en-US" sz="3600" i="1" dirty="0">
+              <a:latin typeface="Avenir Book"/>
+              <a:cs typeface="Avenir Book"/>
+            </a:endParaRPr>
+          </a:p>
+          <a:p>
+            <a:pPr algn="ctr"/>
+            <a:endParaRPr lang="en-US" sz="3600" i="1" dirty="0" smtClean="0">
+              <a:latin typeface="Avenir Book"/>
+              <a:cs typeface="Avenir Book"/>
+            </a:endParaRPr>
+          </a:p>
+          <a:p>
+            <a:pPr algn="ctr"/>
+            <a:endParaRPr lang="en-US" sz="3600" i="1" dirty="0" smtClean="0">
+              <a:latin typeface="Avenir Book"/>
+              <a:cs typeface="Avenir Book"/>
+            </a:endParaRPr>
+          </a:p>
+          <a:p>
+            <a:pPr algn="ctr"/>
             <a:r>
               <a:rPr lang="en-US" sz="3600" dirty="0" smtClean="0">
                 <a:latin typeface="Avenir Book"/>
@@ -3931,15 +4217,25 @@
             </a:r>
           </a:p>
           <a:p>
-            <a:pPr algn="r"/>
-            <a:r>
-              <a:rPr lang="en-US" sz="3600" dirty="0" smtClean="0">
+            <a:pPr algn="ctr"/>
+            <a:r>
+              <a:rPr lang="en-US" sz="2800" dirty="0" smtClean="0">
+                <a:latin typeface="Avenir Book"/>
+                <a:cs typeface="Avenir Book"/>
+              </a:rPr>
+              <a:t>Metis NYC DS9</a:t>
+            </a:r>
+          </a:p>
+          <a:p>
+            <a:pPr algn="ctr"/>
+            <a:r>
+              <a:rPr lang="en-US" sz="2800" dirty="0" smtClean="0">
                 <a:latin typeface="Avenir Book"/>
                 <a:cs typeface="Avenir Book"/>
               </a:rPr>
               <a:t>October 7, 2016</a:t>
             </a:r>
-            <a:endParaRPr lang="en-US" sz="3600" dirty="0">
+            <a:endParaRPr lang="en-US" sz="2800" dirty="0">
               <a:latin typeface="Avenir Book"/>
               <a:cs typeface="Avenir Book"/>
             </a:endParaRPr>
@@ -3967,6 +4263,851 @@
 </file>
 
 <file path=ppt/slides/slide10.xml><?xml version="1.0" encoding="utf-8"?>
+<p:sld xmlns:a="http://schemas.openxmlformats.org/drawingml/2006/main" xmlns:r="http://schemas.openxmlformats.org/officeDocument/2006/relationships" xmlns:p="http://schemas.openxmlformats.org/presentationml/2006/main">
+  <p:cSld>
+    <p:spTree>
+      <p:nvGrpSpPr>
+        <p:cNvPr id="1" name=""/>
+        <p:cNvGrpSpPr/>
+        <p:nvPr/>
+      </p:nvGrpSpPr>
+      <p:grpSpPr>
+        <a:xfrm>
+          <a:off x="0" y="0"/>
+          <a:ext cx="0" cy="0"/>
+          <a:chOff x="0" y="0"/>
+          <a:chExt cx="0" cy="0"/>
+        </a:xfrm>
+      </p:grpSpPr>
+      <p:sp>
+        <p:nvSpPr>
+          <p:cNvPr id="2" name="Title 1"/>
+          <p:cNvSpPr>
+            <a:spLocks noGrp="1"/>
+          </p:cNvSpPr>
+          <p:nvPr>
+            <p:ph type="title"/>
+          </p:nvPr>
+        </p:nvSpPr>
+        <p:spPr>
+          <a:xfrm>
+            <a:off x="457200" y="2623222"/>
+            <a:ext cx="8229600" cy="1143000"/>
+          </a:xfrm>
+        </p:spPr>
+        <p:txBody>
+          <a:bodyPr>
+            <a:normAutofit fontScale="90000"/>
+          </a:bodyPr>
+          <a:lstStyle/>
+          <a:p>
+            <a:pPr algn="l"/>
+            <a:r>
+              <a:rPr lang="en-US" sz="6000" b="1" dirty="0" smtClean="0">
+                <a:latin typeface="Avenir Black"/>
+                <a:cs typeface="Avenir Black"/>
+              </a:rPr>
+              <a:t>Questions?</a:t>
+            </a:r>
+            <a:br>
+              <a:rPr lang="en-US" sz="6000" b="1" dirty="0" smtClean="0">
+                <a:latin typeface="Avenir Black"/>
+                <a:cs typeface="Avenir Black"/>
+              </a:rPr>
+            </a:br>
+            <a:r>
+              <a:rPr lang="en-US" sz="6000" b="1" dirty="0">
+                <a:latin typeface="Avenir Black"/>
+                <a:cs typeface="Avenir Black"/>
+              </a:rPr>
+              <a:t/>
+            </a:r>
+            <a:br>
+              <a:rPr lang="en-US" sz="6000" b="1" dirty="0">
+                <a:latin typeface="Avenir Black"/>
+                <a:cs typeface="Avenir Black"/>
+              </a:rPr>
+            </a:br>
+            <a:r>
+              <a:rPr lang="en-US" sz="6000" b="1" dirty="0" smtClean="0">
+                <a:latin typeface="Avenir Black"/>
+                <a:cs typeface="Avenir Black"/>
+              </a:rPr>
+              <a:t/>
+            </a:r>
+            <a:br>
+              <a:rPr lang="en-US" sz="6000" b="1" dirty="0" smtClean="0">
+                <a:latin typeface="Avenir Black"/>
+                <a:cs typeface="Avenir Black"/>
+              </a:rPr>
+            </a:br>
+            <a:r>
+              <a:rPr lang="en-US" sz="6000" b="1" dirty="0" smtClean="0">
+                <a:latin typeface="Avenir Black"/>
+                <a:cs typeface="Avenir Black"/>
+              </a:rPr>
+              <a:t/>
+            </a:r>
+            <a:br>
+              <a:rPr lang="en-US" sz="6000" b="1" dirty="0" smtClean="0">
+                <a:latin typeface="Avenir Black"/>
+                <a:cs typeface="Avenir Black"/>
+              </a:rPr>
+            </a:br>
+            <a:r>
+              <a:rPr lang="en-US" sz="3600" b="1" dirty="0" smtClean="0">
+                <a:latin typeface="Avenir Book"/>
+                <a:cs typeface="Avenir Book"/>
+              </a:rPr>
+              <a:t>Laura Colón-Meléndez</a:t>
+            </a:r>
+            <a:br>
+              <a:rPr lang="en-US" sz="3600" b="1" dirty="0" smtClean="0">
+                <a:latin typeface="Avenir Book"/>
+                <a:cs typeface="Avenir Book"/>
+              </a:rPr>
+            </a:br>
+            <a:r>
+              <a:rPr lang="en-US" sz="3600" b="1" dirty="0" err="1" smtClean="0">
+                <a:latin typeface="Avenir Book"/>
+                <a:cs typeface="Avenir Book"/>
+              </a:rPr>
+              <a:t>lauradelmar@gmail.com</a:t>
+            </a:r>
+            <a:endParaRPr lang="en-US" sz="3600" b="1" dirty="0">
+              <a:latin typeface="Avenir Book"/>
+              <a:cs typeface="Avenir Book"/>
+            </a:endParaRPr>
+          </a:p>
+        </p:txBody>
+      </p:sp>
+      <p:sp>
+        <p:nvSpPr>
+          <p:cNvPr id="3" name="TextBox 2"/>
+          <p:cNvSpPr txBox="1"/>
+          <p:nvPr/>
+        </p:nvSpPr>
+        <p:spPr>
+          <a:xfrm>
+            <a:off x="4598459" y="3241035"/>
+            <a:ext cx="184666" cy="369332"/>
+          </a:xfrm>
+          <a:prstGeom prst="rect">
+            <a:avLst/>
+          </a:prstGeom>
+          <a:noFill/>
+        </p:spPr>
+        <p:txBody>
+          <a:bodyPr wrap="none" rtlCol="0">
+            <a:spAutoFit/>
+          </a:bodyPr>
+          <a:lstStyle/>
+          <a:p>
+            <a:endParaRPr lang="en-US" dirty="0"/>
+          </a:p>
+        </p:txBody>
+      </p:sp>
+      <p:pic>
+        <p:nvPicPr>
+          <p:cNvPr id="4" name="Picture 3" descr="imgres.png"/>
+          <p:cNvPicPr>
+            <a:picLocks noChangeAspect="1"/>
+          </p:cNvPicPr>
+          <p:nvPr/>
+        </p:nvPicPr>
+        <p:blipFill>
+          <a:blip r:embed="rId2">
+            <a:extLst>
+              <a:ext uri="{28A0092B-C50C-407E-A947-70E740481C1C}">
+                <a14:useLocalDpi xmlns:a14="http://schemas.microsoft.com/office/drawing/2010/main" val="0"/>
+              </a:ext>
+            </a:extLst>
+          </a:blip>
+          <a:stretch>
+            <a:fillRect/>
+          </a:stretch>
+        </p:blipFill>
+        <p:spPr>
+          <a:xfrm>
+            <a:off x="7751687" y="3795035"/>
+            <a:ext cx="1605813" cy="844347"/>
+          </a:xfrm>
+          <a:prstGeom prst="rect">
+            <a:avLst/>
+          </a:prstGeom>
+        </p:spPr>
+      </p:pic>
+      <p:sp>
+        <p:nvSpPr>
+          <p:cNvPr id="5" name="TextBox 4"/>
+          <p:cNvSpPr txBox="1"/>
+          <p:nvPr/>
+        </p:nvSpPr>
+        <p:spPr>
+          <a:xfrm>
+            <a:off x="6131279" y="4131589"/>
+            <a:ext cx="2175144" cy="369332"/>
+          </a:xfrm>
+          <a:prstGeom prst="rect">
+            <a:avLst/>
+          </a:prstGeom>
+          <a:noFill/>
+        </p:spPr>
+        <p:txBody>
+          <a:bodyPr wrap="square" rtlCol="0">
+            <a:spAutoFit/>
+          </a:bodyPr>
+          <a:lstStyle/>
+          <a:p>
+            <a:pPr algn="ctr"/>
+            <a:r>
+              <a:rPr lang="en-US" dirty="0" err="1" smtClean="0">
+                <a:latin typeface="Avenir Black"/>
+                <a:cs typeface="Avenir Black"/>
+                <a:hlinkClick r:id="rId3"/>
+              </a:rPr>
+              <a:t>karmacelina</a:t>
+            </a:r>
+            <a:endParaRPr lang="en-US" dirty="0">
+              <a:latin typeface="Avenir Black"/>
+              <a:cs typeface="Avenir Black"/>
+            </a:endParaRPr>
+          </a:p>
+        </p:txBody>
+      </p:sp>
+    </p:spTree>
+    <p:extLst>
+      <p:ext uri="{BB962C8B-B14F-4D97-AF65-F5344CB8AC3E}">
+        <p14:creationId xmlns:p14="http://schemas.microsoft.com/office/powerpoint/2010/main" val="2208354849"/>
+      </p:ext>
+    </p:extLst>
+  </p:cSld>
+  <p:clrMapOvr>
+    <a:masterClrMapping/>
+  </p:clrMapOvr>
+  <p:timing>
+    <p:tnLst>
+      <p:par>
+        <p:cTn xmlns:p14="http://schemas.microsoft.com/office/powerpoint/2010/main" id="1" dur="indefinite" restart="never" nodeType="tmRoot"/>
+      </p:par>
+    </p:tnLst>
+  </p:timing>
+</p:sld>
+</file>
+
+<file path=ppt/slides/slide11.xml><?xml version="1.0" encoding="utf-8"?>
+<p:sld xmlns:a="http://schemas.openxmlformats.org/drawingml/2006/main" xmlns:r="http://schemas.openxmlformats.org/officeDocument/2006/relationships" xmlns:p="http://schemas.openxmlformats.org/presentationml/2006/main">
+  <p:cSld>
+    <p:spTree>
+      <p:nvGrpSpPr>
+        <p:cNvPr id="1" name=""/>
+        <p:cNvGrpSpPr/>
+        <p:nvPr/>
+      </p:nvGrpSpPr>
+      <p:grpSpPr>
+        <a:xfrm>
+          <a:off x="0" y="0"/>
+          <a:ext cx="0" cy="0"/>
+          <a:chOff x="0" y="0"/>
+          <a:chExt cx="0" cy="0"/>
+        </a:xfrm>
+      </p:grpSpPr>
+      <p:sp>
+        <p:nvSpPr>
+          <p:cNvPr id="2" name="Title 1"/>
+          <p:cNvSpPr>
+            <a:spLocks noGrp="1"/>
+          </p:cNvSpPr>
+          <p:nvPr>
+            <p:ph type="title"/>
+          </p:nvPr>
+        </p:nvSpPr>
+        <p:spPr>
+          <a:xfrm>
+            <a:off x="457200" y="2623222"/>
+            <a:ext cx="8229600" cy="1143000"/>
+          </a:xfrm>
+        </p:spPr>
+        <p:txBody>
+          <a:bodyPr>
+            <a:normAutofit/>
+          </a:bodyPr>
+          <a:lstStyle/>
+          <a:p>
+            <a:r>
+              <a:rPr lang="en-US" sz="6000" b="1" dirty="0" smtClean="0">
+                <a:latin typeface="Avenir Black"/>
+                <a:cs typeface="Avenir Black"/>
+              </a:rPr>
+              <a:t>PLOTS</a:t>
+            </a:r>
+            <a:endParaRPr lang="en-US" sz="6000" b="1" dirty="0">
+              <a:latin typeface="Avenir Black"/>
+              <a:cs typeface="Avenir Black"/>
+            </a:endParaRPr>
+          </a:p>
+        </p:txBody>
+      </p:sp>
+    </p:spTree>
+    <p:extLst>
+      <p:ext uri="{BB962C8B-B14F-4D97-AF65-F5344CB8AC3E}">
+        <p14:creationId xmlns:p14="http://schemas.microsoft.com/office/powerpoint/2010/main" val="4142937862"/>
+      </p:ext>
+    </p:extLst>
+  </p:cSld>
+  <p:clrMapOvr>
+    <a:masterClrMapping/>
+  </p:clrMapOvr>
+  <p:timing>
+    <p:tnLst>
+      <p:par>
+        <p:cTn xmlns:p14="http://schemas.microsoft.com/office/powerpoint/2010/main" id="1" dur="indefinite" restart="never" nodeType="tmRoot"/>
+      </p:par>
+    </p:tnLst>
+  </p:timing>
+</p:sld>
+</file>
+
+<file path=ppt/slides/slide12.xml><?xml version="1.0" encoding="utf-8"?>
+<p:sld xmlns:a="http://schemas.openxmlformats.org/drawingml/2006/main" xmlns:r="http://schemas.openxmlformats.org/officeDocument/2006/relationships" xmlns:p="http://schemas.openxmlformats.org/presentationml/2006/main">
+  <p:cSld>
+    <p:spTree>
+      <p:nvGrpSpPr>
+        <p:cNvPr id="1" name=""/>
+        <p:cNvGrpSpPr/>
+        <p:nvPr/>
+      </p:nvGrpSpPr>
+      <p:grpSpPr>
+        <a:xfrm>
+          <a:off x="0" y="0"/>
+          <a:ext cx="0" cy="0"/>
+          <a:chOff x="0" y="0"/>
+          <a:chExt cx="0" cy="0"/>
+        </a:xfrm>
+      </p:grpSpPr>
+      <p:pic>
+        <p:nvPicPr>
+          <p:cNvPr id="7" name="Picture 6" descr="JcbNe2mSrRUAAAAASUVORK5CYII=.png"/>
+          <p:cNvPicPr>
+            <a:picLocks noChangeAspect="1"/>
+          </p:cNvPicPr>
+          <p:nvPr/>
+        </p:nvPicPr>
+        <p:blipFill>
+          <a:blip r:embed="rId3">
+            <a:extLst>
+              <a:ext uri="{28A0092B-C50C-407E-A947-70E740481C1C}">
+                <a14:useLocalDpi xmlns:a14="http://schemas.microsoft.com/office/drawing/2010/main" val="0"/>
+              </a:ext>
+            </a:extLst>
+          </a:blip>
+          <a:stretch>
+            <a:fillRect/>
+          </a:stretch>
+        </p:blipFill>
+        <p:spPr>
+          <a:xfrm>
+            <a:off x="453990" y="284433"/>
+            <a:ext cx="8311444" cy="5805481"/>
+          </a:xfrm>
+          <a:prstGeom prst="rect">
+            <a:avLst/>
+          </a:prstGeom>
+        </p:spPr>
+      </p:pic>
+      <p:sp>
+        <p:nvSpPr>
+          <p:cNvPr id="8" name="TextBox 7"/>
+          <p:cNvSpPr txBox="1"/>
+          <p:nvPr/>
+        </p:nvSpPr>
+        <p:spPr>
+          <a:xfrm>
+            <a:off x="598530" y="6089914"/>
+            <a:ext cx="8093913" cy="646331"/>
+          </a:xfrm>
+          <a:prstGeom prst="rect">
+            <a:avLst/>
+          </a:prstGeom>
+          <a:noFill/>
+          <a:ln w="63500">
+            <a:solidFill>
+              <a:srgbClr val="FF0000"/>
+            </a:solidFill>
+          </a:ln>
+        </p:spPr>
+        <p:txBody>
+          <a:bodyPr wrap="square" rtlCol="0">
+            <a:spAutoFit/>
+          </a:bodyPr>
+          <a:lstStyle/>
+          <a:p>
+            <a:pPr algn="ctr"/>
+            <a:r>
+              <a:rPr lang="en-US" dirty="0" smtClean="0">
+                <a:latin typeface="Avenir Book"/>
+                <a:cs typeface="Avenir Book"/>
+              </a:rPr>
+              <a:t>Lots of budget information was missing, so I used domestic gross </a:t>
+            </a:r>
+            <a:r>
+              <a:rPr lang="en-US" dirty="0" smtClean="0">
+                <a:latin typeface="Avenir Book"/>
+                <a:cs typeface="Avenir Book"/>
+              </a:rPr>
+              <a:t>instead</a:t>
+            </a:r>
+            <a:r>
+              <a:rPr lang="en-US" dirty="0" smtClean="0">
+                <a:latin typeface="Avenir Book"/>
+                <a:cs typeface="Avenir Book"/>
+              </a:rPr>
+              <a:t>. </a:t>
+            </a:r>
+            <a:r>
+              <a:rPr lang="en-US" dirty="0">
+                <a:latin typeface="Avenir Book"/>
+                <a:cs typeface="Avenir Book"/>
+              </a:rPr>
+              <a:t>M</a:t>
+            </a:r>
+            <a:r>
+              <a:rPr lang="en-US" dirty="0" smtClean="0">
+                <a:latin typeface="Avenir Book"/>
+                <a:cs typeface="Avenir Book"/>
+              </a:rPr>
+              <a:t>easured </a:t>
+            </a:r>
+            <a:r>
+              <a:rPr lang="en-US" dirty="0" smtClean="0">
+                <a:latin typeface="Avenir Book"/>
+                <a:cs typeface="Avenir Book"/>
+              </a:rPr>
+              <a:t>an actor’s average movie domestic gross</a:t>
+            </a:r>
+            <a:endParaRPr lang="en-US" dirty="0">
+              <a:latin typeface="Avenir Book"/>
+              <a:cs typeface="Avenir Book"/>
+            </a:endParaRPr>
+          </a:p>
+        </p:txBody>
+      </p:sp>
+    </p:spTree>
+    <p:extLst>
+      <p:ext uri="{BB962C8B-B14F-4D97-AF65-F5344CB8AC3E}">
+        <p14:creationId xmlns:p14="http://schemas.microsoft.com/office/powerpoint/2010/main" val="1726886620"/>
+      </p:ext>
+    </p:extLst>
+  </p:cSld>
+  <p:clrMapOvr>
+    <a:masterClrMapping/>
+  </p:clrMapOvr>
+  <p:timing>
+    <p:tnLst>
+      <p:par>
+        <p:cTn xmlns:p14="http://schemas.microsoft.com/office/powerpoint/2010/main" id="1" dur="indefinite" restart="never" nodeType="tmRoot"/>
+      </p:par>
+    </p:tnLst>
+  </p:timing>
+</p:sld>
+</file>
+
+<file path=ppt/slides/slide13.xml><?xml version="1.0" encoding="utf-8"?>
+<p:sld xmlns:a="http://schemas.openxmlformats.org/drawingml/2006/main" xmlns:r="http://schemas.openxmlformats.org/officeDocument/2006/relationships" xmlns:p="http://schemas.openxmlformats.org/presentationml/2006/main">
+  <p:cSld>
+    <p:spTree>
+      <p:nvGrpSpPr>
+        <p:cNvPr id="1" name=""/>
+        <p:cNvGrpSpPr/>
+        <p:nvPr/>
+      </p:nvGrpSpPr>
+      <p:grpSpPr>
+        <a:xfrm>
+          <a:off x="0" y="0"/>
+          <a:ext cx="0" cy="0"/>
+          <a:chOff x="0" y="0"/>
+          <a:chExt cx="0" cy="0"/>
+        </a:xfrm>
+      </p:grpSpPr>
+      <p:pic>
+        <p:nvPicPr>
+          <p:cNvPr id="4" name="Picture 3" descr="P5etoW1AmQp3TnA0vzNT0g6T7SQ1KHRsRjpAB7iqSX+rgWY1yCzRjTOvLTvJ2SLmq1FmPq4JGpMcYYUxOPTI0xxpiaeGRqjDHG1MTB1BhjjKmJg6kxxhhTEwdTY4wxpiYOpsYYY0xNHEyNMcaYmvwf5K9z51moQsYAAAAASUVORK5CYII=.png"/>
+          <p:cNvPicPr>
+            <a:picLocks noChangeAspect="1"/>
+          </p:cNvPicPr>
+          <p:nvPr/>
+        </p:nvPicPr>
+        <p:blipFill>
+          <a:blip r:embed="rId2">
+            <a:extLst>
+              <a:ext uri="{28A0092B-C50C-407E-A947-70E740481C1C}">
+                <a14:useLocalDpi xmlns:a14="http://schemas.microsoft.com/office/drawing/2010/main" val="0"/>
+              </a:ext>
+            </a:extLst>
+          </a:blip>
+          <a:stretch>
+            <a:fillRect/>
+          </a:stretch>
+        </p:blipFill>
+        <p:spPr>
+          <a:xfrm>
+            <a:off x="122895" y="154367"/>
+            <a:ext cx="8936682" cy="5147682"/>
+          </a:xfrm>
+          <a:prstGeom prst="rect">
+            <a:avLst/>
+          </a:prstGeom>
+        </p:spPr>
+      </p:pic>
+      <p:sp>
+        <p:nvSpPr>
+          <p:cNvPr id="5" name="Rectangle 4"/>
+          <p:cNvSpPr/>
+          <p:nvPr/>
+        </p:nvSpPr>
+        <p:spPr>
+          <a:xfrm>
+            <a:off x="616784" y="633232"/>
+            <a:ext cx="1594555" cy="592667"/>
+          </a:xfrm>
+          <a:prstGeom prst="rect">
+            <a:avLst/>
+          </a:prstGeom>
+          <a:noFill/>
+          <a:ln w="38100">
+            <a:solidFill>
+              <a:srgbClr val="FF0000"/>
+            </a:solidFill>
+          </a:ln>
+          <a:effectLst/>
+        </p:spPr>
+        <p:style>
+          <a:lnRef idx="1">
+            <a:schemeClr val="accent1"/>
+          </a:lnRef>
+          <a:fillRef idx="3">
+            <a:schemeClr val="accent1"/>
+          </a:fillRef>
+          <a:effectRef idx="2">
+            <a:schemeClr val="accent1"/>
+          </a:effectRef>
+          <a:fontRef idx="minor">
+            <a:schemeClr val="lt1"/>
+          </a:fontRef>
+        </p:style>
+        <p:txBody>
+          <a:bodyPr rtlCol="0" anchor="ctr"/>
+          <a:lstStyle/>
+          <a:p>
+            <a:pPr algn="ctr"/>
+            <a:endParaRPr lang="en-US"/>
+          </a:p>
+        </p:txBody>
+      </p:sp>
+      <p:sp>
+        <p:nvSpPr>
+          <p:cNvPr id="6" name="Title 1"/>
+          <p:cNvSpPr txBox="1">
+            <a:spLocks/>
+          </p:cNvSpPr>
+          <p:nvPr/>
+        </p:nvSpPr>
+        <p:spPr>
+          <a:xfrm>
+            <a:off x="593970" y="5260742"/>
+            <a:ext cx="8229600" cy="1143000"/>
+          </a:xfrm>
+          <a:prstGeom prst="rect">
+            <a:avLst/>
+          </a:prstGeom>
+          <a:solidFill>
+            <a:schemeClr val="accent6">
+              <a:lumMod val="20000"/>
+              <a:lumOff val="80000"/>
+            </a:schemeClr>
+          </a:solidFill>
+        </p:spPr>
+        <p:txBody>
+          <a:bodyPr vert="horz" lIns="91440" tIns="45720" rIns="91440" bIns="45720" rtlCol="0" anchor="ctr">
+            <a:normAutofit/>
+          </a:bodyPr>
+          <a:lstStyle>
+            <a:lvl1pPr algn="ctr" defTabSz="457200" rtl="0" eaLnBrk="1" latinLnBrk="0" hangingPunct="1">
+              <a:spcBef>
+                <a:spcPct val="0"/>
+              </a:spcBef>
+              <a:buNone/>
+              <a:defRPr sz="4400" kern="1200">
+                <a:solidFill>
+                  <a:schemeClr val="tx1"/>
+                </a:solidFill>
+                <a:latin typeface="+mj-lt"/>
+                <a:ea typeface="+mj-ea"/>
+                <a:cs typeface="+mj-cs"/>
+              </a:defRPr>
+            </a:lvl1pPr>
+          </a:lstStyle>
+          <a:p>
+            <a:r>
+              <a:rPr lang="en-US" sz="3200" dirty="0" smtClean="0">
+                <a:solidFill>
+                  <a:srgbClr val="660066"/>
+                </a:solidFill>
+                <a:latin typeface="Avenir Black"/>
+                <a:cs typeface="Avenir Black"/>
+              </a:rPr>
+              <a:t>Gradient Boosted Regression Tree model</a:t>
+            </a:r>
+          </a:p>
+          <a:p>
+            <a:r>
+              <a:rPr lang="en-US" sz="2000" dirty="0" smtClean="0">
+                <a:solidFill>
+                  <a:srgbClr val="660066"/>
+                </a:solidFill>
+                <a:latin typeface="Avenir Black"/>
+                <a:cs typeface="Avenir Black"/>
+              </a:rPr>
+              <a:t>Score: ~0.87</a:t>
+            </a:r>
+          </a:p>
+        </p:txBody>
+      </p:sp>
+      <p:sp>
+        <p:nvSpPr>
+          <p:cNvPr id="7" name="TextBox 6"/>
+          <p:cNvSpPr txBox="1"/>
+          <p:nvPr/>
+        </p:nvSpPr>
+        <p:spPr>
+          <a:xfrm>
+            <a:off x="1037807" y="6403742"/>
+            <a:ext cx="7728958" cy="461665"/>
+          </a:xfrm>
+          <a:prstGeom prst="rect">
+            <a:avLst/>
+          </a:prstGeom>
+          <a:noFill/>
+        </p:spPr>
+        <p:txBody>
+          <a:bodyPr wrap="square" rtlCol="0">
+            <a:spAutoFit/>
+          </a:bodyPr>
+          <a:lstStyle/>
+          <a:p>
+            <a:r>
+              <a:rPr lang="en-US" sz="2400" dirty="0" smtClean="0">
+                <a:latin typeface="Avenir Book"/>
+                <a:cs typeface="Avenir Book"/>
+              </a:rPr>
+              <a:t>Selected features that did better than random noise!</a:t>
+            </a:r>
+            <a:endParaRPr lang="en-US" sz="2400" dirty="0">
+              <a:latin typeface="Avenir Book"/>
+              <a:cs typeface="Avenir Book"/>
+            </a:endParaRPr>
+          </a:p>
+        </p:txBody>
+      </p:sp>
+      <p:cxnSp>
+        <p:nvCxnSpPr>
+          <p:cNvPr id="9" name="Straight Arrow Connector 8"/>
+          <p:cNvCxnSpPr/>
+          <p:nvPr/>
+        </p:nvCxnSpPr>
+        <p:spPr>
+          <a:xfrm flipV="1">
+            <a:off x="4902286" y="928499"/>
+            <a:ext cx="737392" cy="4765438"/>
+          </a:xfrm>
+          <a:prstGeom prst="straightConnector1">
+            <a:avLst/>
+          </a:prstGeom>
+          <a:ln>
+            <a:tailEnd type="arrow"/>
+          </a:ln>
+        </p:spPr>
+        <p:style>
+          <a:lnRef idx="2">
+            <a:schemeClr val="accent1"/>
+          </a:lnRef>
+          <a:fillRef idx="0">
+            <a:schemeClr val="accent1"/>
+          </a:fillRef>
+          <a:effectRef idx="1">
+            <a:schemeClr val="accent1"/>
+          </a:effectRef>
+          <a:fontRef idx="minor">
+            <a:schemeClr val="tx1"/>
+          </a:fontRef>
+        </p:style>
+      </p:cxnSp>
+    </p:spTree>
+    <p:extLst>
+      <p:ext uri="{BB962C8B-B14F-4D97-AF65-F5344CB8AC3E}">
+        <p14:creationId xmlns:p14="http://schemas.microsoft.com/office/powerpoint/2010/main" val="40171864"/>
+      </p:ext>
+    </p:extLst>
+  </p:cSld>
+  <p:clrMapOvr>
+    <a:masterClrMapping/>
+  </p:clrMapOvr>
+  <p:timing>
+    <p:tnLst>
+      <p:par>
+        <p:cTn xmlns:p14="http://schemas.microsoft.com/office/powerpoint/2010/main" id="1" dur="indefinite" restart="never" nodeType="tmRoot">
+          <p:childTnLst>
+            <p:seq concurrent="1" nextAc="seek">
+              <p:cTn id="2" dur="indefinite" nodeType="mainSeq">
+                <p:childTnLst>
+                  <p:par>
+                    <p:cTn id="3" fill="hold">
+                      <p:stCondLst>
+                        <p:cond delay="indefinite"/>
+                      </p:stCondLst>
+                      <p:childTnLst>
+                        <p:par>
+                          <p:cTn id="4" fill="hold">
+                            <p:stCondLst>
+                              <p:cond delay="0"/>
+                            </p:stCondLst>
+                            <p:childTnLst>
+                              <p:par>
+                                <p:cTn id="5" presetID="1" presetClass="entr" presetSubtype="0" fill="hold" grpId="0" nodeType="clickEffect">
+                                  <p:stCondLst>
+                                    <p:cond delay="0"/>
+                                  </p:stCondLst>
+                                  <p:childTnLst>
+                                    <p:set>
+                                      <p:cBhvr>
+                                        <p:cTn id="6" dur="1" fill="hold">
+                                          <p:stCondLst>
+                                            <p:cond delay="0"/>
+                                          </p:stCondLst>
+                                        </p:cTn>
+                                        <p:tgtEl>
+                                          <p:spTgt spid="6"/>
+                                        </p:tgtEl>
+                                        <p:attrNameLst>
+                                          <p:attrName>style.visibility</p:attrName>
+                                        </p:attrNameLst>
+                                      </p:cBhvr>
+                                      <p:to>
+                                        <p:strVal val="visible"/>
+                                      </p:to>
+                                    </p:set>
+                                  </p:childTnLst>
+                                </p:cTn>
+                              </p:par>
+                            </p:childTnLst>
+                          </p:cTn>
+                        </p:par>
+                      </p:childTnLst>
+                    </p:cTn>
+                  </p:par>
+                  <p:par>
+                    <p:cTn id="7" fill="hold">
+                      <p:stCondLst>
+                        <p:cond delay="indefinite"/>
+                      </p:stCondLst>
+                      <p:childTnLst>
+                        <p:par>
+                          <p:cTn id="8" fill="hold">
+                            <p:stCondLst>
+                              <p:cond delay="0"/>
+                            </p:stCondLst>
+                            <p:childTnLst>
+                              <p:par>
+                                <p:cTn id="9" presetID="1" presetClass="entr" presetSubtype="0" fill="hold" grpId="0" nodeType="clickEffect">
+                                  <p:stCondLst>
+                                    <p:cond delay="0"/>
+                                  </p:stCondLst>
+                                  <p:childTnLst>
+                                    <p:set>
+                                      <p:cBhvr>
+                                        <p:cTn id="10" dur="1" fill="hold">
+                                          <p:stCondLst>
+                                            <p:cond delay="0"/>
+                                          </p:stCondLst>
+                                        </p:cTn>
+                                        <p:tgtEl>
+                                          <p:spTgt spid="5"/>
+                                        </p:tgtEl>
+                                        <p:attrNameLst>
+                                          <p:attrName>style.visibility</p:attrName>
+                                        </p:attrNameLst>
+                                      </p:cBhvr>
+                                      <p:to>
+                                        <p:strVal val="visible"/>
+                                      </p:to>
+                                    </p:set>
+                                  </p:childTnLst>
+                                </p:cTn>
+                              </p:par>
+                              <p:par>
+                                <p:cTn id="11" presetID="1" presetClass="entr" presetSubtype="0" fill="hold" grpId="0" nodeType="withEffect">
+                                  <p:stCondLst>
+                                    <p:cond delay="0"/>
+                                  </p:stCondLst>
+                                  <p:childTnLst>
+                                    <p:set>
+                                      <p:cBhvr>
+                                        <p:cTn id="12" dur="1" fill="hold">
+                                          <p:stCondLst>
+                                            <p:cond delay="0"/>
+                                          </p:stCondLst>
+                                        </p:cTn>
+                                        <p:tgtEl>
+                                          <p:spTgt spid="7"/>
+                                        </p:tgtEl>
+                                        <p:attrNameLst>
+                                          <p:attrName>style.visibility</p:attrName>
+                                        </p:attrNameLst>
+                                      </p:cBhvr>
+                                      <p:to>
+                                        <p:strVal val="visible"/>
+                                      </p:to>
+                                    </p:set>
+                                  </p:childTnLst>
+                                </p:cTn>
+                              </p:par>
+                            </p:childTnLst>
+                          </p:cTn>
+                        </p:par>
+                      </p:childTnLst>
+                    </p:cTn>
+                  </p:par>
+                </p:childTnLst>
+              </p:cTn>
+              <p:prevCondLst>
+                <p:cond evt="onPrev" delay="0">
+                  <p:tgtEl>
+                    <p:sldTgt/>
+                  </p:tgtEl>
+                </p:cond>
+              </p:prevCondLst>
+              <p:nextCondLst>
+                <p:cond evt="onNext" delay="0">
+                  <p:tgtEl>
+                    <p:sldTgt/>
+                  </p:tgtEl>
+                </p:cond>
+              </p:nextCondLst>
+            </p:seq>
+          </p:childTnLst>
+        </p:cTn>
+      </p:par>
+    </p:tnLst>
+    <p:bldLst>
+      <p:bldP spid="5" grpId="0" animBg="1"/>
+      <p:bldP spid="6" grpId="0" animBg="1"/>
+      <p:bldP spid="7" grpId="0"/>
+    </p:bldLst>
+  </p:timing>
+</p:sld>
+</file>
+
+<file path=ppt/slides/slide14.xml><?xml version="1.0" encoding="utf-8"?>
 <p:sld xmlns:a="http://schemas.openxmlformats.org/drawingml/2006/main" xmlns:r="http://schemas.openxmlformats.org/officeDocument/2006/relationships" xmlns:p="http://schemas.openxmlformats.org/presentationml/2006/main">
   <p:cSld>
     <p:spTree>
@@ -4070,167 +5211,7 @@
 </p:sld>
 </file>
 
-<file path=ppt/slides/slide11.xml><?xml version="1.0" encoding="utf-8"?>
-<p:sld xmlns:a="http://schemas.openxmlformats.org/drawingml/2006/main" xmlns:r="http://schemas.openxmlformats.org/officeDocument/2006/relationships" xmlns:p="http://schemas.openxmlformats.org/presentationml/2006/main">
-  <p:cSld>
-    <p:spTree>
-      <p:nvGrpSpPr>
-        <p:cNvPr id="1" name=""/>
-        <p:cNvGrpSpPr/>
-        <p:nvPr/>
-      </p:nvGrpSpPr>
-      <p:grpSpPr>
-        <a:xfrm>
-          <a:off x="0" y="0"/>
-          <a:ext cx="0" cy="0"/>
-          <a:chOff x="0" y="0"/>
-          <a:chExt cx="0" cy="0"/>
-        </a:xfrm>
-      </p:grpSpPr>
-      <p:sp>
-        <p:nvSpPr>
-          <p:cNvPr id="5" name="TextBox 4"/>
-          <p:cNvSpPr txBox="1"/>
-          <p:nvPr/>
-        </p:nvSpPr>
-        <p:spPr>
-          <a:xfrm>
-            <a:off x="-291965" y="2253001"/>
-            <a:ext cx="3645994" cy="1200329"/>
-          </a:xfrm>
-          <a:prstGeom prst="rect">
-            <a:avLst/>
-          </a:prstGeom>
-          <a:noFill/>
-        </p:spPr>
-        <p:txBody>
-          <a:bodyPr wrap="square" rtlCol="0">
-            <a:spAutoFit/>
-          </a:bodyPr>
-          <a:lstStyle/>
-          <a:p>
-            <a:pPr algn="ctr"/>
-            <a:r>
-              <a:rPr lang="en-US" sz="3600" dirty="0" smtClean="0">
-                <a:latin typeface="Avenir Black"/>
-                <a:cs typeface="Avenir Black"/>
-              </a:rPr>
-              <a:t>Genre: </a:t>
-            </a:r>
-            <a:endParaRPr lang="en-US" sz="3600" dirty="0" smtClean="0">
-              <a:latin typeface="Avenir Black"/>
-              <a:cs typeface="Avenir Black"/>
-            </a:endParaRPr>
-          </a:p>
-          <a:p>
-            <a:pPr algn="ctr"/>
-            <a:r>
-              <a:rPr lang="en-US" sz="3600" dirty="0" smtClean="0">
-                <a:latin typeface="Avenir Black"/>
-                <a:cs typeface="Avenir Black"/>
-              </a:rPr>
-              <a:t>DRAMA</a:t>
-            </a:r>
-            <a:endParaRPr lang="en-US" sz="3600" dirty="0">
-              <a:latin typeface="Avenir Black"/>
-              <a:cs typeface="Avenir Black"/>
-            </a:endParaRPr>
-          </a:p>
-        </p:txBody>
-      </p:sp>
-      <p:sp>
-        <p:nvSpPr>
-          <p:cNvPr id="2" name="TextBox 1"/>
-          <p:cNvSpPr txBox="1"/>
-          <p:nvPr/>
-        </p:nvSpPr>
-        <p:spPr>
-          <a:xfrm>
-            <a:off x="259525" y="5931817"/>
-            <a:ext cx="8671182" cy="646331"/>
-          </a:xfrm>
-          <a:prstGeom prst="rect">
-            <a:avLst/>
-          </a:prstGeom>
-          <a:noFill/>
-          <a:ln w="38100">
-            <a:solidFill>
-              <a:srgbClr val="FF0000"/>
-            </a:solidFill>
-          </a:ln>
-        </p:spPr>
-        <p:txBody>
-          <a:bodyPr wrap="square" rtlCol="0">
-            <a:spAutoFit/>
-          </a:bodyPr>
-          <a:lstStyle/>
-          <a:p>
-            <a:pPr algn="ctr"/>
-            <a:r>
-              <a:rPr lang="en-US" dirty="0" smtClean="0">
-                <a:latin typeface="Avenir Black"/>
-                <a:cs typeface="Avenir Black"/>
-              </a:rPr>
-              <a:t>Data could be filtered by rejecting actors who have made less than a given number of films </a:t>
-            </a:r>
-            <a:endParaRPr lang="en-US" dirty="0">
-              <a:latin typeface="Avenir Black"/>
-              <a:cs typeface="Avenir Black"/>
-            </a:endParaRPr>
-          </a:p>
-        </p:txBody>
-      </p:sp>
-      <p:pic>
-        <p:nvPicPr>
-          <p:cNvPr id="3" name="Picture 2" descr="widest-release_drama.png"/>
-          <p:cNvPicPr>
-            <a:picLocks noChangeAspect="1"/>
-          </p:cNvPicPr>
-          <p:nvPr/>
-        </p:nvPicPr>
-        <p:blipFill>
-          <a:blip r:embed="rId2">
-            <a:extLst>
-              <a:ext uri="{28A0092B-C50C-407E-A947-70E740481C1C}">
-                <a14:useLocalDpi xmlns:a14="http://schemas.microsoft.com/office/drawing/2010/main" val="0"/>
-              </a:ext>
-            </a:extLst>
-          </a:blip>
-          <a:stretch>
-            <a:fillRect/>
-          </a:stretch>
-        </p:blipFill>
-        <p:spPr>
-          <a:xfrm>
-            <a:off x="3154505" y="74455"/>
-            <a:ext cx="5776201" cy="5776201"/>
-          </a:xfrm>
-          <a:prstGeom prst="rect">
-            <a:avLst/>
-          </a:prstGeom>
-        </p:spPr>
-      </p:pic>
-    </p:spTree>
-    <p:extLst>
-      <p:ext uri="{BB962C8B-B14F-4D97-AF65-F5344CB8AC3E}">
-        <p14:creationId xmlns:p14="http://schemas.microsoft.com/office/powerpoint/2010/main" val="2867607292"/>
-      </p:ext>
-    </p:extLst>
-  </p:cSld>
-  <p:clrMapOvr>
-    <a:masterClrMapping/>
-  </p:clrMapOvr>
-  <p:timing>
-    <p:tnLst>
-      <p:par>
-        <p:cTn xmlns:p14="http://schemas.microsoft.com/office/powerpoint/2010/main" id="1" dur="indefinite" restart="never" nodeType="tmRoot"/>
-      </p:par>
-    </p:tnLst>
-  </p:timing>
-</p:sld>
-</file>
-
-<file path=ppt/slides/slide12.xml><?xml version="1.0" encoding="utf-8"?>
+<file path=ppt/slides/slide15.xml><?xml version="1.0" encoding="utf-8"?>
 <p:sld xmlns:a="http://schemas.openxmlformats.org/drawingml/2006/main" xmlns:r="http://schemas.openxmlformats.org/officeDocument/2006/relationships" xmlns:p="http://schemas.openxmlformats.org/presentationml/2006/main">
   <p:cSld>
     <p:spTree>
@@ -4379,176 +5360,7 @@
 </p:sld>
 </file>
 
-<file path=ppt/slides/slide13.xml><?xml version="1.0" encoding="utf-8"?>
-<p:sld xmlns:a="http://schemas.openxmlformats.org/drawingml/2006/main" xmlns:r="http://schemas.openxmlformats.org/officeDocument/2006/relationships" xmlns:p="http://schemas.openxmlformats.org/presentationml/2006/main">
-  <p:cSld>
-    <p:spTree>
-      <p:nvGrpSpPr>
-        <p:cNvPr id="1" name=""/>
-        <p:cNvGrpSpPr/>
-        <p:nvPr/>
-      </p:nvGrpSpPr>
-      <p:grpSpPr>
-        <a:xfrm>
-          <a:off x="0" y="0"/>
-          <a:ext cx="0" cy="0"/>
-          <a:chOff x="0" y="0"/>
-          <a:chExt cx="0" cy="0"/>
-        </a:xfrm>
-      </p:grpSpPr>
-      <p:pic>
-        <p:nvPicPr>
-          <p:cNvPr id="4" name="Picture 3" descr="widest-release_PG13.png"/>
-          <p:cNvPicPr>
-            <a:picLocks noChangeAspect="1"/>
-          </p:cNvPicPr>
-          <p:nvPr/>
-        </p:nvPicPr>
-        <p:blipFill>
-          <a:blip r:embed="rId2">
-            <a:extLst>
-              <a:ext uri="{28A0092B-C50C-407E-A947-70E740481C1C}">
-                <a14:useLocalDpi xmlns:a14="http://schemas.microsoft.com/office/drawing/2010/main" val="0"/>
-              </a:ext>
-            </a:extLst>
-          </a:blip>
-          <a:stretch>
-            <a:fillRect/>
-          </a:stretch>
-        </p:blipFill>
-        <p:spPr>
-          <a:xfrm>
-            <a:off x="1899054" y="804419"/>
-            <a:ext cx="5486400" cy="5486400"/>
-          </a:xfrm>
-          <a:prstGeom prst="rect">
-            <a:avLst/>
-          </a:prstGeom>
-        </p:spPr>
-      </p:pic>
-      <p:sp>
-        <p:nvSpPr>
-          <p:cNvPr id="6" name="Rectangle 5"/>
-          <p:cNvSpPr/>
-          <p:nvPr/>
-        </p:nvSpPr>
-        <p:spPr>
-          <a:xfrm>
-            <a:off x="504996" y="400317"/>
-            <a:ext cx="2330453" cy="646331"/>
-          </a:xfrm>
-          <a:prstGeom prst="rect">
-            <a:avLst/>
-          </a:prstGeom>
-        </p:spPr>
-        <p:txBody>
-          <a:bodyPr wrap="none">
-            <a:spAutoFit/>
-          </a:bodyPr>
-          <a:lstStyle/>
-          <a:p>
-            <a:r>
-              <a:rPr lang="en-US" sz="3600" dirty="0" smtClean="0">
-                <a:latin typeface="Avenir Black"/>
-                <a:cs typeface="Avenir Black"/>
-              </a:rPr>
-              <a:t>RUNTIME</a:t>
-            </a:r>
-            <a:endParaRPr lang="en-US" sz="3600" dirty="0">
-              <a:latin typeface="Avenir Black"/>
-              <a:cs typeface="Avenir Black"/>
-            </a:endParaRPr>
-          </a:p>
-        </p:txBody>
-      </p:sp>
-    </p:spTree>
-    <p:extLst>
-      <p:ext uri="{BB962C8B-B14F-4D97-AF65-F5344CB8AC3E}">
-        <p14:creationId xmlns:p14="http://schemas.microsoft.com/office/powerpoint/2010/main" val="1143717521"/>
-      </p:ext>
-    </p:extLst>
-  </p:cSld>
-  <p:clrMapOvr>
-    <a:masterClrMapping/>
-  </p:clrMapOvr>
-  <p:timing>
-    <p:tnLst>
-      <p:par>
-        <p:cTn xmlns:p14="http://schemas.microsoft.com/office/powerpoint/2010/main" id="1" dur="indefinite" restart="never" nodeType="tmRoot"/>
-      </p:par>
-    </p:tnLst>
-  </p:timing>
-</p:sld>
-</file>
-
-<file path=ppt/slides/slide14.xml><?xml version="1.0" encoding="utf-8"?>
-<p:sld xmlns:a="http://schemas.openxmlformats.org/drawingml/2006/main" xmlns:r="http://schemas.openxmlformats.org/officeDocument/2006/relationships" xmlns:p="http://schemas.openxmlformats.org/presentationml/2006/main">
-  <p:cSld>
-    <p:spTree>
-      <p:nvGrpSpPr>
-        <p:cNvPr id="1" name=""/>
-        <p:cNvGrpSpPr/>
-        <p:nvPr/>
-      </p:nvGrpSpPr>
-      <p:grpSpPr>
-        <a:xfrm>
-          <a:off x="0" y="0"/>
-          <a:ext cx="0" cy="0"/>
-          <a:chOff x="0" y="0"/>
-          <a:chExt cx="0" cy="0"/>
-        </a:xfrm>
-      </p:grpSpPr>
-      <p:pic>
-        <p:nvPicPr>
-          <p:cNvPr id="4" name="Picture 3" descr="dDjeuCbAAAAABJRU5ErkJggg==.png"/>
-          <p:cNvPicPr>
-            <a:picLocks noChangeAspect="1"/>
-          </p:cNvPicPr>
-          <p:nvPr/>
-        </p:nvPicPr>
-        <p:blipFill>
-          <a:blip r:embed="rId2">
-            <a:extLst>
-              <a:ext uri="{28A0092B-C50C-407E-A947-70E740481C1C}">
-                <a14:useLocalDpi xmlns:a14="http://schemas.microsoft.com/office/drawing/2010/main" val="0"/>
-              </a:ext>
-            </a:extLst>
-          </a:blip>
-          <a:stretch>
-            <a:fillRect/>
-          </a:stretch>
-        </p:blipFill>
-        <p:spPr>
-          <a:xfrm>
-            <a:off x="1402706" y="269218"/>
-            <a:ext cx="6630377" cy="6493197"/>
-          </a:xfrm>
-          <a:prstGeom prst="rect">
-            <a:avLst/>
-          </a:prstGeom>
-        </p:spPr>
-      </p:pic>
-    </p:spTree>
-    <p:extLst>
-      <p:ext uri="{BB962C8B-B14F-4D97-AF65-F5344CB8AC3E}">
-        <p14:creationId xmlns:p14="http://schemas.microsoft.com/office/powerpoint/2010/main" val="1789074507"/>
-      </p:ext>
-    </p:extLst>
-  </p:cSld>
-  <p:clrMapOvr>
-    <a:masterClrMapping/>
-  </p:clrMapOvr>
-  <p:timing>
-    <p:tnLst>
-      <p:par>
-        <p:cTn xmlns:p14="http://schemas.microsoft.com/office/powerpoint/2010/main" id="1" dur="indefinite" restart="never" nodeType="tmRoot"/>
-      </p:par>
-    </p:tnLst>
-  </p:timing>
-</p:sld>
-</file>
-
-<file path=ppt/slides/slide15.xml><?xml version="1.0" encoding="utf-8"?>
+<file path=ppt/slides/slide16.xml><?xml version="1.0" encoding="utf-8"?>
 <p:sld xmlns:a="http://schemas.openxmlformats.org/drawingml/2006/main" xmlns:r="http://schemas.openxmlformats.org/officeDocument/2006/relationships" xmlns:p="http://schemas.openxmlformats.org/presentationml/2006/main">
   <p:cSld>
     <p:spTree>
@@ -4615,141 +5427,7 @@
 </p:sld>
 </file>
 
-<file path=ppt/slides/slide16.xml><?xml version="1.0" encoding="utf-8"?>
-<p:sld xmlns:a="http://schemas.openxmlformats.org/drawingml/2006/main" xmlns:r="http://schemas.openxmlformats.org/officeDocument/2006/relationships" xmlns:p="http://schemas.openxmlformats.org/presentationml/2006/main">
-  <p:cSld>
-    <p:spTree>
-      <p:nvGrpSpPr>
-        <p:cNvPr id="1" name=""/>
-        <p:cNvGrpSpPr/>
-        <p:nvPr/>
-      </p:nvGrpSpPr>
-      <p:grpSpPr>
-        <a:xfrm>
-          <a:off x="0" y="0"/>
-          <a:ext cx="0" cy="0"/>
-          <a:chOff x="0" y="0"/>
-          <a:chExt cx="0" cy="0"/>
-        </a:xfrm>
-      </p:grpSpPr>
-      <p:pic>
-        <p:nvPicPr>
-          <p:cNvPr id="4" name="Picture 3" descr="CT6iP9iDoAAAAASUVORK5CYII=.png"/>
-          <p:cNvPicPr>
-            <a:picLocks noChangeAspect="1"/>
-          </p:cNvPicPr>
-          <p:nvPr/>
-        </p:nvPicPr>
-        <p:blipFill>
-          <a:blip r:embed="rId2">
-            <a:extLst>
-              <a:ext uri="{28A0092B-C50C-407E-A947-70E740481C1C}">
-                <a14:useLocalDpi xmlns:a14="http://schemas.microsoft.com/office/drawing/2010/main" val="0"/>
-              </a:ext>
-            </a:extLst>
-          </a:blip>
-          <a:stretch>
-            <a:fillRect/>
-          </a:stretch>
-        </p:blipFill>
-        <p:spPr>
-          <a:xfrm>
-            <a:off x="2549703" y="831429"/>
-            <a:ext cx="5524500" cy="5410200"/>
-          </a:xfrm>
-          <a:prstGeom prst="rect">
-            <a:avLst/>
-          </a:prstGeom>
-        </p:spPr>
-      </p:pic>
-    </p:spTree>
-    <p:extLst>
-      <p:ext uri="{BB962C8B-B14F-4D97-AF65-F5344CB8AC3E}">
-        <p14:creationId xmlns:p14="http://schemas.microsoft.com/office/powerpoint/2010/main" val="2415073830"/>
-      </p:ext>
-    </p:extLst>
-  </p:cSld>
-  <p:clrMapOvr>
-    <a:masterClrMapping/>
-  </p:clrMapOvr>
-  <p:timing>
-    <p:tnLst>
-      <p:par>
-        <p:cTn xmlns:p14="http://schemas.microsoft.com/office/powerpoint/2010/main" id="1" dur="indefinite" restart="never" nodeType="tmRoot"/>
-      </p:par>
-    </p:tnLst>
-  </p:timing>
-</p:sld>
-</file>
-
 <file path=ppt/slides/slide17.xml><?xml version="1.0" encoding="utf-8"?>
-<p:sld xmlns:a="http://schemas.openxmlformats.org/drawingml/2006/main" xmlns:r="http://schemas.openxmlformats.org/officeDocument/2006/relationships" xmlns:p="http://schemas.openxmlformats.org/presentationml/2006/main">
-  <p:cSld>
-    <p:spTree>
-      <p:nvGrpSpPr>
-        <p:cNvPr id="1" name=""/>
-        <p:cNvGrpSpPr/>
-        <p:nvPr/>
-      </p:nvGrpSpPr>
-      <p:grpSpPr>
-        <a:xfrm>
-          <a:off x="0" y="0"/>
-          <a:ext cx="0" cy="0"/>
-          <a:chOff x="0" y="0"/>
-          <a:chExt cx="0" cy="0"/>
-        </a:xfrm>
-      </p:grpSpPr>
-      <p:pic>
-        <p:nvPicPr>
-          <p:cNvPr id="4" name="Picture 3" descr="AWfaIMDXb2xdAAAAAElFTkSuQmCC.png"/>
-          <p:cNvPicPr>
-            <a:picLocks noChangeAspect="1"/>
-          </p:cNvPicPr>
-          <p:nvPr/>
-        </p:nvPicPr>
-        <p:blipFill>
-          <a:blip r:embed="rId2">
-            <a:extLst>
-              <a:ext uri="{28A0092B-C50C-407E-A947-70E740481C1C}">
-                <a14:useLocalDpi xmlns:a14="http://schemas.microsoft.com/office/drawing/2010/main" val="0"/>
-              </a:ext>
-            </a:extLst>
-          </a:blip>
-          <a:stretch>
-            <a:fillRect/>
-          </a:stretch>
-        </p:blipFill>
-        <p:spPr>
-          <a:xfrm>
-            <a:off x="2428657" y="805619"/>
-            <a:ext cx="5029200" cy="4838700"/>
-          </a:xfrm>
-          <a:prstGeom prst="rect">
-            <a:avLst/>
-          </a:prstGeom>
-        </p:spPr>
-      </p:pic>
-    </p:spTree>
-    <p:extLst>
-      <p:ext uri="{BB962C8B-B14F-4D97-AF65-F5344CB8AC3E}">
-        <p14:creationId xmlns:p14="http://schemas.microsoft.com/office/powerpoint/2010/main" val="1628786324"/>
-      </p:ext>
-    </p:extLst>
-  </p:cSld>
-  <p:clrMapOvr>
-    <a:masterClrMapping/>
-  </p:clrMapOvr>
-  <p:timing>
-    <p:tnLst>
-      <p:par>
-        <p:cTn xmlns:p14="http://schemas.microsoft.com/office/powerpoint/2010/main" id="1" dur="indefinite" restart="never" nodeType="tmRoot"/>
-      </p:par>
-    </p:tnLst>
-  </p:timing>
-</p:sld>
-</file>
-
-<file path=ppt/slides/slide18.xml><?xml version="1.0" encoding="utf-8"?>
 <p:sld xmlns:a="http://schemas.openxmlformats.org/drawingml/2006/main" xmlns:r="http://schemas.openxmlformats.org/officeDocument/2006/relationships" xmlns:p="http://schemas.openxmlformats.org/presentationml/2006/main">
   <p:cSld>
     <p:spTree>
@@ -4878,7 +5556,7 @@
           <p:nvPr/>
         </p:nvPicPr>
         <p:blipFill>
-          <a:blip r:embed="rId2">
+          <a:blip r:embed="rId3">
             <a:extLst>
               <a:ext uri="{28A0092B-C50C-407E-A947-70E740481C1C}">
                 <a14:useLocalDpi xmlns:a14="http://schemas.microsoft.com/office/drawing/2010/main" val="0"/>
@@ -4891,7 +5569,7 @@
         </p:blipFill>
         <p:spPr>
           <a:xfrm>
-            <a:off x="5343691" y="1171856"/>
+            <a:off x="5343691" y="354297"/>
             <a:ext cx="3800309" cy="3800309"/>
           </a:xfrm>
           <a:prstGeom prst="rect">
@@ -4907,7 +5585,7 @@
         </p:nvSpPr>
         <p:spPr>
           <a:xfrm>
-            <a:off x="559871" y="5237510"/>
+            <a:off x="822640" y="4870501"/>
             <a:ext cx="7797235" cy="1200329"/>
           </a:xfrm>
           <a:prstGeom prst="rect">
@@ -4975,7 +5653,7 @@
         </p:nvSpPr>
         <p:spPr>
           <a:xfrm>
-            <a:off x="1149245" y="2530063"/>
+            <a:off x="596315" y="2208879"/>
             <a:ext cx="3561870" cy="1200329"/>
           </a:xfrm>
           <a:prstGeom prst="rect">
@@ -5006,10 +5684,6 @@
               </a:rPr>
               <a:t>You are an </a:t>
             </a:r>
-            <a:endParaRPr lang="en-US" sz="3600" dirty="0" smtClean="0">
-              <a:latin typeface="Avenir Book"/>
-              <a:cs typeface="Avenir Book"/>
-            </a:endParaRPr>
           </a:p>
           <a:p>
             <a:pPr algn="ctr"/>
@@ -5018,12 +5692,8 @@
                 <a:latin typeface="Avenir Book"/>
                 <a:cs typeface="Avenir Book"/>
               </a:rPr>
-              <a:t>actor or actress</a:t>
-            </a:r>
-            <a:endParaRPr lang="en-US" sz="3600" dirty="0" smtClean="0">
-              <a:latin typeface="Avenir Book"/>
-              <a:cs typeface="Avenir Book"/>
-            </a:endParaRPr>
+              <a:t>actor or actress*</a:t>
+            </a:r>
           </a:p>
         </p:txBody>
       </p:sp>
@@ -5039,7 +5709,7 @@
         </p:nvSpPr>
         <p:spPr>
           <a:xfrm>
-            <a:off x="113844" y="28856"/>
+            <a:off x="43385" y="43455"/>
             <a:ext cx="8229600" cy="1143000"/>
           </a:xfrm>
         </p:spPr>
@@ -5049,7 +5719,7 @@
           <a:p>
             <a:pPr algn="l"/>
             <a:r>
-              <a:rPr lang="en-US" i="1" u="sng" dirty="0" smtClean="0">
+              <a:rPr lang="en-US" u="sng" dirty="0" smtClean="0">
                 <a:latin typeface="Avenir Heavy"/>
                 <a:cs typeface="Avenir Heavy"/>
               </a:rPr>
@@ -5200,7 +5870,7 @@
           <a:p>
             <a:pPr algn="l"/>
             <a:r>
-              <a:rPr lang="en-US" i="1" u="sng" dirty="0" smtClean="0">
+              <a:rPr lang="en-US" u="sng" dirty="0">
                 <a:latin typeface="Avenir Heavy"/>
                 <a:cs typeface="Avenir Heavy"/>
               </a:rPr>
@@ -5222,7 +5892,7 @@
         </p:nvSpPr>
         <p:spPr>
           <a:xfrm>
-            <a:off x="113844" y="1499563"/>
+            <a:off x="113844" y="1644784"/>
             <a:ext cx="8229600" cy="808057"/>
           </a:xfrm>
         </p:spPr>
@@ -5325,7 +5995,7 @@
         </p:blipFill>
         <p:spPr>
           <a:xfrm>
-            <a:off x="5793787" y="1386041"/>
+            <a:off x="5487223" y="1542589"/>
             <a:ext cx="3111500" cy="711200"/>
           </a:xfrm>
           <a:prstGeom prst="rect">
@@ -5333,285 +6003,6 @@
           </a:prstGeom>
         </p:spPr>
       </p:pic>
-      <p:grpSp>
-        <p:nvGrpSpPr>
-          <p:cNvPr id="13" name="Group 12"/>
-          <p:cNvGrpSpPr/>
-          <p:nvPr/>
-        </p:nvGrpSpPr>
-        <p:grpSpPr>
-          <a:xfrm>
-            <a:off x="805672" y="2545369"/>
-            <a:ext cx="7537772" cy="1939857"/>
-            <a:chOff x="805672" y="2866547"/>
-            <a:chExt cx="7537772" cy="1939857"/>
-          </a:xfrm>
-        </p:grpSpPr>
-        <p:sp>
-          <p:nvSpPr>
-            <p:cNvPr id="7" name="Rounded Rectangle 6"/>
-            <p:cNvSpPr/>
-            <p:nvPr/>
-          </p:nvSpPr>
-          <p:spPr>
-            <a:xfrm>
-              <a:off x="805672" y="3892004"/>
-              <a:ext cx="3550406" cy="914400"/>
-            </a:xfrm>
-            <a:prstGeom prst="roundRect">
-              <a:avLst/>
-            </a:prstGeom>
-            <a:solidFill>
-              <a:schemeClr val="accent5">
-                <a:lumMod val="20000"/>
-                <a:lumOff val="80000"/>
-              </a:schemeClr>
-            </a:solidFill>
-            <a:ln w="25400">
-              <a:solidFill>
-                <a:srgbClr val="3366FF"/>
-              </a:solidFill>
-            </a:ln>
-            <a:effectLst/>
-          </p:spPr>
-          <p:style>
-            <a:lnRef idx="1">
-              <a:schemeClr val="accent1"/>
-            </a:lnRef>
-            <a:fillRef idx="3">
-              <a:schemeClr val="accent1"/>
-            </a:fillRef>
-            <a:effectRef idx="2">
-              <a:schemeClr val="accent1"/>
-            </a:effectRef>
-            <a:fontRef idx="minor">
-              <a:schemeClr val="lt1"/>
-            </a:fontRef>
-          </p:style>
-          <p:txBody>
-            <a:bodyPr rtlCol="0" anchor="ctr"/>
-            <a:lstStyle/>
-            <a:p>
-              <a:pPr algn="ctr"/>
-              <a:r>
-                <a:rPr lang="en-US" sz="2400" b="1" dirty="0" smtClean="0">
-                  <a:solidFill>
-                    <a:schemeClr val="tx1"/>
-                  </a:solidFill>
-                  <a:latin typeface="Avenir Black"/>
-                  <a:cs typeface="Avenir Black"/>
-                </a:rPr>
-                <a:t>AVERAGE DOMESTIC GROSS</a:t>
-              </a:r>
-              <a:endParaRPr lang="en-US" sz="2400" b="1" dirty="0">
-                <a:solidFill>
-                  <a:schemeClr val="tx1"/>
-                </a:solidFill>
-                <a:latin typeface="Avenir Black"/>
-                <a:cs typeface="Avenir Black"/>
-              </a:endParaRPr>
-            </a:p>
-          </p:txBody>
-        </p:sp>
-        <p:sp>
-          <p:nvSpPr>
-            <p:cNvPr id="8" name="Rounded Rectangle 7"/>
-            <p:cNvSpPr/>
-            <p:nvPr/>
-          </p:nvSpPr>
-          <p:spPr>
-            <a:xfrm>
-              <a:off x="4793038" y="3892004"/>
-              <a:ext cx="3550406" cy="914400"/>
-            </a:xfrm>
-            <a:prstGeom prst="roundRect">
-              <a:avLst/>
-            </a:prstGeom>
-            <a:solidFill>
-              <a:schemeClr val="accent5">
-                <a:lumMod val="20000"/>
-                <a:lumOff val="80000"/>
-              </a:schemeClr>
-            </a:solidFill>
-            <a:ln w="25400">
-              <a:solidFill>
-                <a:srgbClr val="3366FF"/>
-              </a:solidFill>
-            </a:ln>
-            <a:effectLst/>
-          </p:spPr>
-          <p:style>
-            <a:lnRef idx="1">
-              <a:schemeClr val="accent1"/>
-            </a:lnRef>
-            <a:fillRef idx="3">
-              <a:schemeClr val="accent1"/>
-            </a:fillRef>
-            <a:effectRef idx="2">
-              <a:schemeClr val="accent1"/>
-            </a:effectRef>
-            <a:fontRef idx="minor">
-              <a:schemeClr val="lt1"/>
-            </a:fontRef>
-          </p:style>
-          <p:txBody>
-            <a:bodyPr rtlCol="0" anchor="ctr"/>
-            <a:lstStyle/>
-            <a:p>
-              <a:pPr algn="ctr"/>
-              <a:r>
-                <a:rPr lang="en-US" sz="2400" b="1" dirty="0" smtClean="0">
-                  <a:solidFill>
-                    <a:srgbClr val="000000"/>
-                  </a:solidFill>
-                  <a:latin typeface="Avenir Black"/>
-                  <a:cs typeface="Avenir Black"/>
-                </a:rPr>
-                <a:t>RELEASE SEASON</a:t>
-              </a:r>
-              <a:endParaRPr lang="en-US" sz="2400" b="1" dirty="0">
-                <a:solidFill>
-                  <a:srgbClr val="000000"/>
-                </a:solidFill>
-                <a:latin typeface="Avenir Black"/>
-                <a:cs typeface="Avenir Black"/>
-              </a:endParaRPr>
-            </a:p>
-          </p:txBody>
-        </p:sp>
-        <p:sp>
-          <p:nvSpPr>
-            <p:cNvPr id="9" name="Rounded Rectangle 8"/>
-            <p:cNvSpPr/>
-            <p:nvPr/>
-          </p:nvSpPr>
-          <p:spPr>
-            <a:xfrm>
-              <a:off x="805672" y="2866547"/>
-              <a:ext cx="3550406" cy="914400"/>
-            </a:xfrm>
-            <a:prstGeom prst="roundRect">
-              <a:avLst/>
-            </a:prstGeom>
-            <a:solidFill>
-              <a:schemeClr val="accent5">
-                <a:lumMod val="20000"/>
-                <a:lumOff val="80000"/>
-              </a:schemeClr>
-            </a:solidFill>
-            <a:ln w="25400">
-              <a:solidFill>
-                <a:srgbClr val="3366FF"/>
-              </a:solidFill>
-            </a:ln>
-            <a:effectLst/>
-          </p:spPr>
-          <p:style>
-            <a:lnRef idx="1">
-              <a:schemeClr val="accent1"/>
-            </a:lnRef>
-            <a:fillRef idx="3">
-              <a:schemeClr val="accent1"/>
-            </a:fillRef>
-            <a:effectRef idx="2">
-              <a:schemeClr val="accent1"/>
-            </a:effectRef>
-            <a:fontRef idx="minor">
-              <a:schemeClr val="lt1"/>
-            </a:fontRef>
-          </p:style>
-          <p:txBody>
-            <a:bodyPr rtlCol="0" anchor="ctr"/>
-            <a:lstStyle/>
-            <a:p>
-              <a:pPr algn="ctr"/>
-              <a:r>
-                <a:rPr lang="en-US" sz="2400" b="1" dirty="0" smtClean="0">
-                  <a:solidFill>
-                    <a:schemeClr val="tx1"/>
-                  </a:solidFill>
-                  <a:latin typeface="Avenir Black"/>
-                  <a:cs typeface="Avenir Black"/>
-                </a:rPr>
-                <a:t>FILM GENRES</a:t>
-              </a:r>
-              <a:endParaRPr lang="en-US" sz="2400" b="1" dirty="0">
-                <a:solidFill>
-                  <a:schemeClr val="tx1"/>
-                </a:solidFill>
-                <a:latin typeface="Avenir Black"/>
-                <a:cs typeface="Avenir Black"/>
-              </a:endParaRPr>
-            </a:p>
-          </p:txBody>
-        </p:sp>
-        <p:sp>
-          <p:nvSpPr>
-            <p:cNvPr id="10" name="Rounded Rectangle 9"/>
-            <p:cNvSpPr/>
-            <p:nvPr/>
-          </p:nvSpPr>
-          <p:spPr>
-            <a:xfrm>
-              <a:off x="4793038" y="2866547"/>
-              <a:ext cx="3550406" cy="914400"/>
-            </a:xfrm>
-            <a:prstGeom prst="roundRect">
-              <a:avLst/>
-            </a:prstGeom>
-            <a:solidFill>
-              <a:schemeClr val="accent5">
-                <a:lumMod val="20000"/>
-                <a:lumOff val="80000"/>
-              </a:schemeClr>
-            </a:solidFill>
-            <a:ln w="25400">
-              <a:solidFill>
-                <a:srgbClr val="3366FF"/>
-              </a:solidFill>
-            </a:ln>
-            <a:effectLst/>
-          </p:spPr>
-          <p:style>
-            <a:lnRef idx="1">
-              <a:schemeClr val="accent1"/>
-            </a:lnRef>
-            <a:fillRef idx="3">
-              <a:schemeClr val="accent1"/>
-            </a:fillRef>
-            <a:effectRef idx="2">
-              <a:schemeClr val="accent1"/>
-            </a:effectRef>
-            <a:fontRef idx="minor">
-              <a:schemeClr val="lt1"/>
-            </a:fontRef>
-          </p:style>
-          <p:txBody>
-            <a:bodyPr rtlCol="0" anchor="ctr"/>
-            <a:lstStyle/>
-            <a:p>
-              <a:pPr algn="ctr"/>
-              <a:r>
-                <a:rPr lang="en-US" sz="2400" b="1" dirty="0" smtClean="0">
-                  <a:solidFill>
-                    <a:schemeClr val="tx1"/>
-                  </a:solidFill>
-                  <a:latin typeface="Avenir Black"/>
-                  <a:cs typeface="Avenir Black"/>
-                </a:rPr>
-                <a:t>FILM RATINGS</a:t>
-              </a:r>
-              <a:endParaRPr lang="en-US" sz="2400" b="1" dirty="0">
-                <a:solidFill>
-                  <a:schemeClr val="tx1"/>
-                </a:solidFill>
-                <a:latin typeface="Avenir Black"/>
-                <a:cs typeface="Avenir Black"/>
-              </a:endParaRPr>
-            </a:p>
-          </p:txBody>
-        </p:sp>
-      </p:grpSp>
       <p:sp>
         <p:nvSpPr>
           <p:cNvPr id="12" name="Title 1"/>
@@ -5664,17 +6055,7 @@
                 <a:latin typeface="Avenir Black"/>
                 <a:cs typeface="Avenir Black"/>
               </a:rPr>
-              <a:t>Gradient</a:t>
-            </a:r>
-            <a:r>
-              <a:rPr lang="en-US" sz="3200" dirty="0" smtClean="0">
-                <a:solidFill>
-                  <a:srgbClr val="660066"/>
-                </a:solidFill>
-                <a:latin typeface="Avenir Black"/>
-                <a:cs typeface="Avenir Black"/>
-              </a:rPr>
-              <a:t>-Boosted Regression Trees model</a:t>
+              <a:t>Gradient-Boosted Regression Trees model</a:t>
             </a:r>
           </a:p>
         </p:txBody>
@@ -5739,6 +6120,199 @@
           </a:prstGeom>
         </p:spPr>
       </p:pic>
+      <p:pic>
+        <p:nvPicPr>
+          <p:cNvPr id="11" name="Picture 10" descr="imgres.jpg"/>
+          <p:cNvPicPr>
+            <a:picLocks noChangeAspect="1"/>
+          </p:cNvPicPr>
+          <p:nvPr/>
+        </p:nvPicPr>
+        <p:blipFill>
+          <a:blip r:embed="rId6">
+            <a:extLst>
+              <a:ext uri="{28A0092B-C50C-407E-A947-70E740481C1C}">
+                <a14:useLocalDpi xmlns:a14="http://schemas.microsoft.com/office/drawing/2010/main" val="0"/>
+              </a:ext>
+            </a:extLst>
+          </a:blip>
+          <a:stretch>
+            <a:fillRect/>
+          </a:stretch>
+        </p:blipFill>
+        <p:spPr>
+          <a:xfrm>
+            <a:off x="6087579" y="43457"/>
+            <a:ext cx="1104432" cy="1314274"/>
+          </a:xfrm>
+          <a:prstGeom prst="rect">
+            <a:avLst/>
+          </a:prstGeom>
+        </p:spPr>
+      </p:pic>
+      <p:sp>
+        <p:nvSpPr>
+          <p:cNvPr id="14" name="Rectangle 13"/>
+          <p:cNvSpPr/>
+          <p:nvPr/>
+        </p:nvSpPr>
+        <p:spPr>
+          <a:xfrm>
+            <a:off x="7192011" y="476555"/>
+            <a:ext cx="1736205" cy="369332"/>
+          </a:xfrm>
+          <a:prstGeom prst="rect">
+            <a:avLst/>
+          </a:prstGeom>
+        </p:spPr>
+        <p:txBody>
+          <a:bodyPr wrap="none">
+            <a:spAutoFit/>
+          </a:bodyPr>
+          <a:lstStyle/>
+          <a:p>
+            <a:r>
+              <a:rPr lang="en-US" b="1" i="1" dirty="0" err="1" smtClean="0">
+                <a:latin typeface="Avenir Heavy"/>
+                <a:cs typeface="Avenir Heavy"/>
+              </a:rPr>
+              <a:t>BeautifulSoup</a:t>
+            </a:r>
+            <a:endParaRPr lang="en-US" b="1" dirty="0"/>
+          </a:p>
+        </p:txBody>
+      </p:sp>
+      <p:sp>
+        <p:nvSpPr>
+          <p:cNvPr id="15" name="Rounded Rectangle 14"/>
+          <p:cNvSpPr/>
+          <p:nvPr/>
+        </p:nvSpPr>
+        <p:spPr>
+          <a:xfrm rot="16200000">
+            <a:off x="-481026" y="3135515"/>
+            <a:ext cx="2112514" cy="914400"/>
+          </a:xfrm>
+          <a:prstGeom prst="roundRect">
+            <a:avLst/>
+          </a:prstGeom>
+          <a:solidFill>
+            <a:srgbClr val="FFFF00">
+              <a:alpha val="49000"/>
+            </a:srgbClr>
+          </a:solidFill>
+          <a:ln w="25400">
+            <a:solidFill>
+              <a:srgbClr val="3366FF"/>
+            </a:solidFill>
+          </a:ln>
+          <a:effectLst/>
+        </p:spPr>
+        <p:style>
+          <a:lnRef idx="1">
+            <a:schemeClr val="accent1"/>
+          </a:lnRef>
+          <a:fillRef idx="3">
+            <a:schemeClr val="accent1"/>
+          </a:fillRef>
+          <a:effectRef idx="2">
+            <a:schemeClr val="accent1"/>
+          </a:effectRef>
+          <a:fontRef idx="minor">
+            <a:schemeClr val="lt1"/>
+          </a:fontRef>
+        </p:style>
+        <p:txBody>
+          <a:bodyPr rtlCol="0" anchor="ctr"/>
+          <a:lstStyle/>
+          <a:p>
+            <a:pPr algn="ctr"/>
+            <a:r>
+              <a:rPr lang="en-US" sz="2400" b="1" dirty="0" smtClean="0">
+                <a:solidFill>
+                  <a:schemeClr val="tx1"/>
+                </a:solidFill>
+                <a:latin typeface="Avenir Black"/>
+                <a:cs typeface="Avenir Black"/>
+              </a:rPr>
+              <a:t>ACTOR</a:t>
+            </a:r>
+            <a:endParaRPr lang="en-US" sz="2400" b="1" dirty="0">
+              <a:solidFill>
+                <a:schemeClr val="tx1"/>
+              </a:solidFill>
+              <a:latin typeface="Avenir Black"/>
+              <a:cs typeface="Avenir Black"/>
+            </a:endParaRPr>
+          </a:p>
+        </p:txBody>
+      </p:sp>
+      <p:sp>
+        <p:nvSpPr>
+          <p:cNvPr id="16" name="Rounded Rectangle 15"/>
+          <p:cNvSpPr/>
+          <p:nvPr/>
+        </p:nvSpPr>
+        <p:spPr>
+          <a:xfrm>
+            <a:off x="3229607" y="3201220"/>
+            <a:ext cx="3550406" cy="914400"/>
+          </a:xfrm>
+          <a:prstGeom prst="roundRect">
+            <a:avLst/>
+          </a:prstGeom>
+          <a:solidFill>
+            <a:schemeClr val="accent5">
+              <a:lumMod val="20000"/>
+              <a:lumOff val="80000"/>
+            </a:schemeClr>
+          </a:solidFill>
+          <a:ln w="25400">
+            <a:solidFill>
+              <a:srgbClr val="3366FF"/>
+            </a:solidFill>
+          </a:ln>
+          <a:effectLst/>
+        </p:spPr>
+        <p:style>
+          <a:lnRef idx="1">
+            <a:schemeClr val="accent1"/>
+          </a:lnRef>
+          <a:fillRef idx="3">
+            <a:schemeClr val="accent1"/>
+          </a:fillRef>
+          <a:effectRef idx="2">
+            <a:schemeClr val="accent1"/>
+          </a:effectRef>
+          <a:fontRef idx="minor">
+            <a:schemeClr val="lt1"/>
+          </a:fontRef>
+        </p:style>
+        <p:txBody>
+          <a:bodyPr rtlCol="0" anchor="ctr"/>
+          <a:lstStyle/>
+          <a:p>
+            <a:pPr algn="ctr"/>
+            <a:r>
+              <a:rPr lang="en-US" sz="2400" b="1" dirty="0" smtClean="0">
+                <a:solidFill>
+                  <a:schemeClr val="tx1"/>
+                </a:solidFill>
+                <a:latin typeface="Avenir Black"/>
+                <a:cs typeface="Avenir Black"/>
+              </a:rPr>
+              <a:t>Average widest release #  </a:t>
+            </a:r>
+            <a:endParaRPr lang="en-US" sz="2400" b="1" dirty="0">
+              <a:solidFill>
+                <a:schemeClr val="tx1"/>
+              </a:solidFill>
+              <a:latin typeface="Avenir Black"/>
+              <a:cs typeface="Avenir Black"/>
+            </a:endParaRPr>
+          </a:p>
+        </p:txBody>
+      </p:sp>
     </p:spTree>
     <p:extLst>
       <p:ext uri="{BB962C8B-B14F-4D97-AF65-F5344CB8AC3E}">
@@ -5770,7 +6344,7 @@
                             </p:stCondLst>
                             <p:childTnLst>
                               <p:par>
-                                <p:cTn id="5" presetID="1" presetClass="entr" presetSubtype="0" fill="hold" nodeType="clickEffect">
+                                <p:cTn id="5" presetID="1" presetClass="entr" presetSubtype="0" fill="hold" grpId="0" nodeType="clickEffect">
                                   <p:stCondLst>
                                     <p:cond delay="0"/>
                                   </p:stCondLst>
@@ -5783,7 +6357,7 @@
                                           </p:stCondLst>
                                         </p:cTn>
                                         <p:tgtEl>
-                                          <p:spTgt spid="13"/>
+                                          <p:spTgt spid="16"/>
                                         </p:tgtEl>
                                         <p:attrNameLst>
                                           <p:attrName>style.visibility</p:attrName>
@@ -5797,7 +6371,7 @@
                                 </p:cTn>
                               </p:par>
                               <p:par>
-                                <p:cTn id="7" presetID="1" presetClass="entr" presetSubtype="0" fill="hold" nodeType="withEffect">
+                                <p:cTn id="7" presetID="1" presetClass="entr" presetSubtype="0" fill="hold" grpId="0" nodeType="withEffect">
                                   <p:stCondLst>
                                     <p:cond delay="0"/>
                                   </p:stCondLst>
@@ -5810,7 +6384,7 @@
                                           </p:stCondLst>
                                         </p:cTn>
                                         <p:tgtEl>
-                                          <p:spTgt spid="6"/>
+                                          <p:spTgt spid="15"/>
                                         </p:tgtEl>
                                         <p:attrNameLst>
                                           <p:attrName>style.visibility</p:attrName>
@@ -5842,7 +6416,7 @@
                             </p:stCondLst>
                             <p:childTnLst>
                               <p:par>
-                                <p:cTn id="11" presetID="1" presetClass="entr" presetSubtype="0" fill="hold" grpId="0" nodeType="clickEffect">
+                                <p:cTn id="11" presetID="1" presetClass="exit" presetSubtype="0" fill="hold" grpId="1" nodeType="clickEffect">
                                   <p:stCondLst>
                                     <p:cond delay="0"/>
                                   </p:stCondLst>
@@ -5850,6 +6424,51 @@
                                     <p:set>
                                       <p:cBhvr>
                                         <p:cTn id="12" dur="1" fill="hold">
+                                          <p:stCondLst>
+                                            <p:cond delay="0"/>
+                                          </p:stCondLst>
+                                        </p:cTn>
+                                        <p:tgtEl>
+                                          <p:spTgt spid="16"/>
+                                        </p:tgtEl>
+                                        <p:attrNameLst>
+                                          <p:attrName>style.visibility</p:attrName>
+                                        </p:attrNameLst>
+                                      </p:cBhvr>
+                                      <p:to>
+                                        <p:strVal val="hidden"/>
+                                      </p:to>
+                                    </p:set>
+                                  </p:childTnLst>
+                                </p:cTn>
+                              </p:par>
+                            </p:childTnLst>
+                          </p:cTn>
+                        </p:par>
+                      </p:childTnLst>
+                    </p:cTn>
+                  </p:par>
+                  <p:par>
+                    <p:cTn id="13" fill="hold">
+                      <p:stCondLst>
+                        <p:cond delay="indefinite"/>
+                      </p:stCondLst>
+                      <p:childTnLst>
+                        <p:par>
+                          <p:cTn id="14" fill="hold">
+                            <p:stCondLst>
+                              <p:cond delay="0"/>
+                            </p:stCondLst>
+                            <p:childTnLst>
+                              <p:par>
+                                <p:cTn id="15" presetID="1" presetClass="entr" presetSubtype="0" fill="hold" grpId="0" nodeType="clickEffect">
+                                  <p:stCondLst>
+                                    <p:cond delay="0"/>
+                                  </p:stCondLst>
+                                  <p:childTnLst>
+                                    <p:set>
+                                      <p:cBhvr>
+                                        <p:cTn id="16" dur="1" fill="hold">
                                           <p:stCondLst>
                                             <p:cond delay="0"/>
                                           </p:stCondLst>
@@ -5869,14 +6488,41 @@
                                 </p:cTn>
                               </p:par>
                               <p:par>
-                                <p:cTn id="13" presetID="1" presetClass="entr" presetSubtype="0" fill="hold" nodeType="withEffect">
+                                <p:cTn id="17" presetID="1" presetClass="entr" presetSubtype="0" fill="hold" nodeType="withEffect">
                                   <p:stCondLst>
                                     <p:cond delay="0"/>
                                   </p:stCondLst>
                                   <p:childTnLst>
                                     <p:set>
                                       <p:cBhvr>
-                                        <p:cTn id="14" dur="1" fill="hold">
+                                        <p:cTn id="18" dur="1" fill="hold">
+                                          <p:stCondLst>
+                                            <p:cond delay="0"/>
+                                          </p:stCondLst>
+                                        </p:cTn>
+                                        <p:tgtEl>
+                                          <p:spTgt spid="6"/>
+                                        </p:tgtEl>
+                                        <p:attrNameLst>
+                                          <p:attrName>style.visibility</p:attrName>
+                                        </p:attrNameLst>
+                                      </p:cBhvr>
+                                      <p:to>
+                                        <p:strVal val="visible"/>
+                                      </p:to>
+                                    </p:set>
+                                  </p:childTnLst>
+                                </p:cTn>
+                              </p:par>
+                              <p:par>
+                                <p:cTn id="19" presetID="1" presetClass="entr" presetSubtype="0" fill="hold" nodeType="withEffect">
+                                  <p:stCondLst>
+                                    <p:cond delay="0"/>
+                                  </p:stCondLst>
+                                  <p:childTnLst>
+                                    <p:set>
+                                      <p:cBhvr>
+                                        <p:cTn id="20" dur="1" fill="hold">
                                           <p:stCondLst>
                                             <p:cond delay="0"/>
                                           </p:stCondLst>
@@ -5924,6 +6570,9 @@
     </p:tnLst>
     <p:bldLst>
       <p:bldP spid="12" grpId="0" animBg="1"/>
+      <p:bldP spid="15" grpId="0" animBg="1"/>
+      <p:bldP spid="16" grpId="0" animBg="1"/>
+      <p:bldP spid="16" grpId="1" animBg="1"/>
     </p:bldLst>
   </p:timing>
 </p:sld>
@@ -5946,6 +6595,512 @@
           <a:chExt cx="0" cy="0"/>
         </a:xfrm>
       </p:grpSpPr>
+      <p:pic>
+        <p:nvPicPr>
+          <p:cNvPr id="2" name="Picture 1" descr="widest-release_domestic-gross.png"/>
+          <p:cNvPicPr>
+            <a:picLocks noChangeAspect="1"/>
+          </p:cNvPicPr>
+          <p:nvPr/>
+        </p:nvPicPr>
+        <p:blipFill>
+          <a:blip r:embed="rId3">
+            <a:extLst>
+              <a:ext uri="{28A0092B-C50C-407E-A947-70E740481C1C}">
+                <a14:useLocalDpi xmlns:a14="http://schemas.microsoft.com/office/drawing/2010/main" val="0"/>
+              </a:ext>
+            </a:extLst>
+          </a:blip>
+          <a:stretch>
+            <a:fillRect/>
+          </a:stretch>
+        </p:blipFill>
+        <p:spPr>
+          <a:xfrm>
+            <a:off x="169032" y="437974"/>
+            <a:ext cx="6373895" cy="6373895"/>
+          </a:xfrm>
+          <a:prstGeom prst="rect">
+            <a:avLst/>
+          </a:prstGeom>
+        </p:spPr>
+      </p:pic>
+      <p:sp>
+        <p:nvSpPr>
+          <p:cNvPr id="5" name="TextBox 4"/>
+          <p:cNvSpPr txBox="1"/>
+          <p:nvPr/>
+        </p:nvSpPr>
+        <p:spPr>
+          <a:xfrm>
+            <a:off x="169032" y="10304"/>
+            <a:ext cx="8843583" cy="584776"/>
+          </a:xfrm>
+          <a:prstGeom prst="rect">
+            <a:avLst/>
+          </a:prstGeom>
+          <a:noFill/>
+        </p:spPr>
+        <p:txBody>
+          <a:bodyPr wrap="square" rtlCol="0">
+            <a:spAutoFit/>
+          </a:bodyPr>
+          <a:lstStyle/>
+          <a:p>
+            <a:pPr algn="ctr"/>
+            <a:r>
+              <a:rPr lang="en-US" sz="3200" dirty="0" smtClean="0">
+                <a:latin typeface="Avenir Black"/>
+                <a:cs typeface="Avenir Black"/>
+              </a:rPr>
+              <a:t>ACTOR’S AVERAGE DOMESTIC GROSS</a:t>
+            </a:r>
+            <a:endParaRPr lang="en-US" sz="3200" dirty="0">
+              <a:latin typeface="Avenir Black"/>
+              <a:cs typeface="Avenir Black"/>
+            </a:endParaRPr>
+          </a:p>
+        </p:txBody>
+      </p:sp>
+      <p:sp>
+        <p:nvSpPr>
+          <p:cNvPr id="3" name="TextBox 2"/>
+          <p:cNvSpPr txBox="1"/>
+          <p:nvPr/>
+        </p:nvSpPr>
+        <p:spPr>
+          <a:xfrm>
+            <a:off x="6729809" y="2394278"/>
+            <a:ext cx="1970768" cy="2308324"/>
+          </a:xfrm>
+          <a:prstGeom prst="rect">
+            <a:avLst/>
+          </a:prstGeom>
+          <a:noFill/>
+          <a:ln w="38100">
+            <a:solidFill>
+              <a:srgbClr val="FF0000"/>
+            </a:solidFill>
+          </a:ln>
+        </p:spPr>
+        <p:txBody>
+          <a:bodyPr wrap="square" rtlCol="0">
+            <a:spAutoFit/>
+          </a:bodyPr>
+          <a:lstStyle/>
+          <a:p>
+            <a:pPr algn="ctr"/>
+            <a:r>
+              <a:rPr lang="en-US" dirty="0" smtClean="0">
+                <a:latin typeface="Avenir Black"/>
+                <a:cs typeface="Avenir Black"/>
+              </a:rPr>
+              <a:t>Having a high average domestic gross is correlated with having a high average widest theater release #</a:t>
+            </a:r>
+            <a:endParaRPr lang="en-US" dirty="0">
+              <a:latin typeface="Avenir Black"/>
+              <a:cs typeface="Avenir Black"/>
+            </a:endParaRPr>
+          </a:p>
+        </p:txBody>
+      </p:sp>
+    </p:spTree>
+    <p:extLst>
+      <p:ext uri="{BB962C8B-B14F-4D97-AF65-F5344CB8AC3E}">
+        <p14:creationId xmlns:p14="http://schemas.microsoft.com/office/powerpoint/2010/main" val="2290044835"/>
+      </p:ext>
+    </p:extLst>
+  </p:cSld>
+  <p:clrMapOvr>
+    <a:masterClrMapping/>
+  </p:clrMapOvr>
+  <p:timing>
+    <p:tnLst>
+      <p:par>
+        <p:cTn xmlns:p14="http://schemas.microsoft.com/office/powerpoint/2010/main" id="1" dur="indefinite" restart="never" nodeType="tmRoot"/>
+      </p:par>
+    </p:tnLst>
+  </p:timing>
+</p:sld>
+</file>
+
+<file path=ppt/slides/slide5.xml><?xml version="1.0" encoding="utf-8"?>
+<p:sld xmlns:a="http://schemas.openxmlformats.org/drawingml/2006/main" xmlns:r="http://schemas.openxmlformats.org/officeDocument/2006/relationships" xmlns:p="http://schemas.openxmlformats.org/presentationml/2006/main">
+  <p:cSld>
+    <p:spTree>
+      <p:nvGrpSpPr>
+        <p:cNvPr id="1" name=""/>
+        <p:cNvGrpSpPr/>
+        <p:nvPr/>
+      </p:nvGrpSpPr>
+      <p:grpSpPr>
+        <a:xfrm>
+          <a:off x="0" y="0"/>
+          <a:ext cx="0" cy="0"/>
+          <a:chOff x="0" y="0"/>
+          <a:chExt cx="0" cy="0"/>
+        </a:xfrm>
+      </p:grpSpPr>
+      <p:sp>
+        <p:nvSpPr>
+          <p:cNvPr id="5" name="TextBox 4"/>
+          <p:cNvSpPr txBox="1"/>
+          <p:nvPr/>
+        </p:nvSpPr>
+        <p:spPr>
+          <a:xfrm>
+            <a:off x="-291965" y="851472"/>
+            <a:ext cx="3645994" cy="1200329"/>
+          </a:xfrm>
+          <a:prstGeom prst="rect">
+            <a:avLst/>
+          </a:prstGeom>
+          <a:noFill/>
+        </p:spPr>
+        <p:txBody>
+          <a:bodyPr wrap="square" rtlCol="0">
+            <a:spAutoFit/>
+          </a:bodyPr>
+          <a:lstStyle/>
+          <a:p>
+            <a:pPr algn="ctr"/>
+            <a:r>
+              <a:rPr lang="en-US" sz="3600" dirty="0" smtClean="0">
+                <a:latin typeface="Avenir Black"/>
+                <a:cs typeface="Avenir Black"/>
+              </a:rPr>
+              <a:t>Genre: </a:t>
+            </a:r>
+          </a:p>
+          <a:p>
+            <a:pPr algn="ctr"/>
+            <a:r>
+              <a:rPr lang="en-US" sz="3600" dirty="0" smtClean="0">
+                <a:latin typeface="Avenir Black"/>
+                <a:cs typeface="Avenir Black"/>
+              </a:rPr>
+              <a:t>DRAMA</a:t>
+            </a:r>
+            <a:endParaRPr lang="en-US" sz="3600" dirty="0">
+              <a:latin typeface="Avenir Black"/>
+              <a:cs typeface="Avenir Black"/>
+            </a:endParaRPr>
+          </a:p>
+        </p:txBody>
+      </p:sp>
+      <p:sp>
+        <p:nvSpPr>
+          <p:cNvPr id="2" name="TextBox 1"/>
+          <p:cNvSpPr txBox="1"/>
+          <p:nvPr/>
+        </p:nvSpPr>
+        <p:spPr>
+          <a:xfrm>
+            <a:off x="259525" y="5931817"/>
+            <a:ext cx="8671182" cy="646331"/>
+          </a:xfrm>
+          <a:prstGeom prst="rect">
+            <a:avLst/>
+          </a:prstGeom>
+          <a:noFill/>
+          <a:ln w="38100">
+            <a:solidFill>
+              <a:srgbClr val="FF0000"/>
+            </a:solidFill>
+          </a:ln>
+        </p:spPr>
+        <p:txBody>
+          <a:bodyPr wrap="square" rtlCol="0">
+            <a:spAutoFit/>
+          </a:bodyPr>
+          <a:lstStyle/>
+          <a:p>
+            <a:pPr algn="ctr"/>
+            <a:r>
+              <a:rPr lang="en-US" dirty="0" smtClean="0">
+                <a:latin typeface="Avenir Black"/>
+                <a:cs typeface="Avenir Black"/>
+              </a:rPr>
+              <a:t>Data could be filtered by rejecting actors who have made less than a given number of films </a:t>
+            </a:r>
+            <a:endParaRPr lang="en-US" dirty="0">
+              <a:latin typeface="Avenir Black"/>
+              <a:cs typeface="Avenir Black"/>
+            </a:endParaRPr>
+          </a:p>
+        </p:txBody>
+      </p:sp>
+      <p:pic>
+        <p:nvPicPr>
+          <p:cNvPr id="3" name="Picture 2" descr="widest-release_drama.png"/>
+          <p:cNvPicPr>
+            <a:picLocks noChangeAspect="1"/>
+          </p:cNvPicPr>
+          <p:nvPr/>
+        </p:nvPicPr>
+        <p:blipFill>
+          <a:blip r:embed="rId3">
+            <a:extLst>
+              <a:ext uri="{28A0092B-C50C-407E-A947-70E740481C1C}">
+                <a14:useLocalDpi xmlns:a14="http://schemas.microsoft.com/office/drawing/2010/main" val="0"/>
+              </a:ext>
+            </a:extLst>
+          </a:blip>
+          <a:stretch>
+            <a:fillRect/>
+          </a:stretch>
+        </p:blipFill>
+        <p:spPr>
+          <a:xfrm>
+            <a:off x="3154505" y="74455"/>
+            <a:ext cx="5776201" cy="5776201"/>
+          </a:xfrm>
+          <a:prstGeom prst="rect">
+            <a:avLst/>
+          </a:prstGeom>
+        </p:spPr>
+      </p:pic>
+    </p:spTree>
+    <p:extLst>
+      <p:ext uri="{BB962C8B-B14F-4D97-AF65-F5344CB8AC3E}">
+        <p14:creationId xmlns:p14="http://schemas.microsoft.com/office/powerpoint/2010/main" val="2867607292"/>
+      </p:ext>
+    </p:extLst>
+  </p:cSld>
+  <p:clrMapOvr>
+    <a:masterClrMapping/>
+  </p:clrMapOvr>
+  <p:timing>
+    <p:tnLst>
+      <p:par>
+        <p:cTn xmlns:p14="http://schemas.microsoft.com/office/powerpoint/2010/main" id="1" dur="indefinite" restart="never" nodeType="tmRoot"/>
+      </p:par>
+    </p:tnLst>
+  </p:timing>
+</p:sld>
+</file>
+
+<file path=ppt/slides/slide6.xml><?xml version="1.0" encoding="utf-8"?>
+<p:sld xmlns:a="http://schemas.openxmlformats.org/drawingml/2006/main" xmlns:r="http://schemas.openxmlformats.org/officeDocument/2006/relationships" xmlns:p="http://schemas.openxmlformats.org/presentationml/2006/main">
+  <p:cSld>
+    <p:spTree>
+      <p:nvGrpSpPr>
+        <p:cNvPr id="1" name=""/>
+        <p:cNvGrpSpPr/>
+        <p:nvPr/>
+      </p:nvGrpSpPr>
+      <p:grpSpPr>
+        <a:xfrm>
+          <a:off x="0" y="0"/>
+          <a:ext cx="0" cy="0"/>
+          <a:chOff x="0" y="0"/>
+          <a:chExt cx="0" cy="0"/>
+        </a:xfrm>
+      </p:grpSpPr>
+      <p:pic>
+        <p:nvPicPr>
+          <p:cNvPr id="4" name="Picture 3" descr="widest-release_PG13.png"/>
+          <p:cNvPicPr>
+            <a:picLocks noChangeAspect="1"/>
+          </p:cNvPicPr>
+          <p:nvPr/>
+        </p:nvPicPr>
+        <p:blipFill>
+          <a:blip r:embed="rId2">
+            <a:extLst>
+              <a:ext uri="{28A0092B-C50C-407E-A947-70E740481C1C}">
+                <a14:useLocalDpi xmlns:a14="http://schemas.microsoft.com/office/drawing/2010/main" val="0"/>
+              </a:ext>
+            </a:extLst>
+          </a:blip>
+          <a:stretch>
+            <a:fillRect/>
+          </a:stretch>
+        </p:blipFill>
+        <p:spPr>
+          <a:xfrm>
+            <a:off x="1941110" y="576487"/>
+            <a:ext cx="5956561" cy="5956561"/>
+          </a:xfrm>
+          <a:prstGeom prst="rect">
+            <a:avLst/>
+          </a:prstGeom>
+        </p:spPr>
+      </p:pic>
+      <p:sp>
+        <p:nvSpPr>
+          <p:cNvPr id="6" name="Rectangle 5"/>
+          <p:cNvSpPr/>
+          <p:nvPr/>
+        </p:nvSpPr>
+        <p:spPr>
+          <a:xfrm>
+            <a:off x="87588" y="164745"/>
+            <a:ext cx="4442084" cy="646331"/>
+          </a:xfrm>
+          <a:prstGeom prst="rect">
+            <a:avLst/>
+          </a:prstGeom>
+        </p:spPr>
+        <p:txBody>
+          <a:bodyPr wrap="none">
+            <a:spAutoFit/>
+          </a:bodyPr>
+          <a:lstStyle/>
+          <a:p>
+            <a:r>
+              <a:rPr lang="en-US" sz="3600" dirty="0" smtClean="0">
+                <a:latin typeface="Avenir Black"/>
+                <a:cs typeface="Avenir Black"/>
+              </a:rPr>
+              <a:t>MPAA Rating PG13</a:t>
+            </a:r>
+            <a:endParaRPr lang="en-US" sz="3600" dirty="0">
+              <a:latin typeface="Avenir Black"/>
+              <a:cs typeface="Avenir Black"/>
+            </a:endParaRPr>
+          </a:p>
+        </p:txBody>
+      </p:sp>
+    </p:spTree>
+    <p:extLst>
+      <p:ext uri="{BB962C8B-B14F-4D97-AF65-F5344CB8AC3E}">
+        <p14:creationId xmlns:p14="http://schemas.microsoft.com/office/powerpoint/2010/main" val="1143717521"/>
+      </p:ext>
+    </p:extLst>
+  </p:cSld>
+  <p:clrMapOvr>
+    <a:masterClrMapping/>
+  </p:clrMapOvr>
+  <p:timing>
+    <p:tnLst>
+      <p:par>
+        <p:cTn xmlns:p14="http://schemas.microsoft.com/office/powerpoint/2010/main" id="1" dur="indefinite" restart="never" nodeType="tmRoot"/>
+      </p:par>
+    </p:tnLst>
+  </p:timing>
+</p:sld>
+</file>
+
+<file path=ppt/slides/slide7.xml><?xml version="1.0" encoding="utf-8"?>
+<p:sld xmlns:a="http://schemas.openxmlformats.org/drawingml/2006/main" xmlns:r="http://schemas.openxmlformats.org/officeDocument/2006/relationships" xmlns:p="http://schemas.openxmlformats.org/presentationml/2006/main">
+  <p:cSld>
+    <p:spTree>
+      <p:nvGrpSpPr>
+        <p:cNvPr id="1" name=""/>
+        <p:cNvGrpSpPr/>
+        <p:nvPr/>
+      </p:nvGrpSpPr>
+      <p:grpSpPr>
+        <a:xfrm>
+          <a:off x="0" y="0"/>
+          <a:ext cx="0" cy="0"/>
+          <a:chOff x="0" y="0"/>
+          <a:chExt cx="0" cy="0"/>
+        </a:xfrm>
+      </p:grpSpPr>
+      <p:pic>
+        <p:nvPicPr>
+          <p:cNvPr id="2" name="Picture 1" descr="widest-release_runtime.png"/>
+          <p:cNvPicPr>
+            <a:picLocks noChangeAspect="1"/>
+          </p:cNvPicPr>
+          <p:nvPr/>
+        </p:nvPicPr>
+        <p:blipFill>
+          <a:blip r:embed="rId2">
+            <a:extLst>
+              <a:ext uri="{28A0092B-C50C-407E-A947-70E740481C1C}">
+                <a14:useLocalDpi xmlns:a14="http://schemas.microsoft.com/office/drawing/2010/main" val="0"/>
+              </a:ext>
+            </a:extLst>
+          </a:blip>
+          <a:stretch>
+            <a:fillRect/>
+          </a:stretch>
+        </p:blipFill>
+        <p:spPr>
+          <a:xfrm>
+            <a:off x="2234813" y="0"/>
+            <a:ext cx="6772327" cy="6772327"/>
+          </a:xfrm>
+          <a:prstGeom prst="rect">
+            <a:avLst/>
+          </a:prstGeom>
+        </p:spPr>
+      </p:pic>
+      <p:sp>
+        <p:nvSpPr>
+          <p:cNvPr id="6" name="Rectangle 5"/>
+          <p:cNvSpPr/>
+          <p:nvPr/>
+        </p:nvSpPr>
+        <p:spPr>
+          <a:xfrm>
+            <a:off x="504996" y="400317"/>
+            <a:ext cx="2330453" cy="646331"/>
+          </a:xfrm>
+          <a:prstGeom prst="rect">
+            <a:avLst/>
+          </a:prstGeom>
+        </p:spPr>
+        <p:txBody>
+          <a:bodyPr wrap="none">
+            <a:spAutoFit/>
+          </a:bodyPr>
+          <a:lstStyle/>
+          <a:p>
+            <a:r>
+              <a:rPr lang="en-US" sz="3600" dirty="0" smtClean="0">
+                <a:latin typeface="Avenir Black"/>
+                <a:cs typeface="Avenir Black"/>
+              </a:rPr>
+              <a:t>RUNTIME</a:t>
+            </a:r>
+            <a:endParaRPr lang="en-US" sz="3600" dirty="0">
+              <a:latin typeface="Avenir Black"/>
+              <a:cs typeface="Avenir Black"/>
+            </a:endParaRPr>
+          </a:p>
+        </p:txBody>
+      </p:sp>
+    </p:spTree>
+    <p:extLst>
+      <p:ext uri="{BB962C8B-B14F-4D97-AF65-F5344CB8AC3E}">
+        <p14:creationId xmlns:p14="http://schemas.microsoft.com/office/powerpoint/2010/main" val="1789074507"/>
+      </p:ext>
+    </p:extLst>
+  </p:cSld>
+  <p:clrMapOvr>
+    <a:masterClrMapping/>
+  </p:clrMapOvr>
+  <p:timing>
+    <p:tnLst>
+      <p:par>
+        <p:cTn xmlns:p14="http://schemas.microsoft.com/office/powerpoint/2010/main" id="1" dur="indefinite" restart="never" nodeType="tmRoot"/>
+      </p:par>
+    </p:tnLst>
+  </p:timing>
+</p:sld>
+</file>
+
+<file path=ppt/slides/slide8.xml><?xml version="1.0" encoding="utf-8"?>
+<p:sld xmlns:a="http://schemas.openxmlformats.org/drawingml/2006/main" xmlns:r="http://schemas.openxmlformats.org/officeDocument/2006/relationships" xmlns:p="http://schemas.openxmlformats.org/presentationml/2006/main">
+  <p:cSld>
+    <p:spTree>
+      <p:nvGrpSpPr>
+        <p:cNvPr id="1" name=""/>
+        <p:cNvGrpSpPr/>
+        <p:nvPr/>
+      </p:nvGrpSpPr>
+      <p:grpSpPr>
+        <a:xfrm>
+          <a:off x="0" y="0"/>
+          <a:ext cx="0" cy="0"/>
+          <a:chOff x="0" y="0"/>
+          <a:chExt cx="0" cy="0"/>
+        </a:xfrm>
+      </p:grpSpPr>
       <p:sp>
         <p:nvSpPr>
           <p:cNvPr id="2" name="Title 1"/>
@@ -6019,19 +7174,8 @@
                 <a:latin typeface="Avenir Heavy"/>
                 <a:cs typeface="Avenir Heavy"/>
               </a:rPr>
-              <a:t>Look for parts in PG-13 </a:t>
-            </a:r>
-            <a:r>
-              <a:rPr lang="en-US" sz="3600" dirty="0" smtClean="0">
-                <a:latin typeface="Avenir Heavy"/>
-                <a:cs typeface="Avenir Heavy"/>
-              </a:rPr>
-              <a:t>movies</a:t>
-            </a:r>
-            <a:endParaRPr lang="en-US" sz="3600" dirty="0" smtClean="0">
-              <a:latin typeface="Avenir Heavy"/>
-              <a:cs typeface="Avenir Heavy"/>
-            </a:endParaRPr>
+              <a:t>Look for parts in PG-13 movies</a:t>
+            </a:r>
           </a:p>
         </p:txBody>
       </p:sp>
@@ -6210,19 +7354,8 @@
                 <a:latin typeface="Avenir Heavy"/>
                 <a:cs typeface="Avenir Heavy"/>
               </a:rPr>
-              <a:t>Avoid </a:t>
-            </a:r>
-            <a:r>
-              <a:rPr lang="en-US" sz="3600" dirty="0" smtClean="0">
-                <a:latin typeface="Avenir Heavy"/>
-                <a:cs typeface="Avenir Heavy"/>
-              </a:rPr>
-              <a:t>drama</a:t>
-            </a:r>
-            <a:endParaRPr lang="en-US" sz="3600" dirty="0" smtClean="0">
-              <a:latin typeface="Avenir Heavy"/>
-              <a:cs typeface="Avenir Heavy"/>
-            </a:endParaRPr>
+              <a:t>Avoid drama</a:t>
+            </a:r>
           </a:p>
           <a:p>
             <a:pPr marL="0" indent="0" algn="ctr">
@@ -6248,7 +7381,7 @@
                 <a:latin typeface="Avenir Heavy"/>
                 <a:cs typeface="Avenir Heavy"/>
               </a:rPr>
-              <a:t>Avoid movies with long runtimes</a:t>
+              <a:t>Avoid movies with long runtimes*</a:t>
             </a:r>
             <a:endParaRPr lang="en-US" sz="3600" dirty="0">
               <a:latin typeface="Avenir Heavy"/>
@@ -6323,26 +7456,48 @@
                 <a:latin typeface="Avenir Heavy"/>
                 <a:cs typeface="Avenir Heavy"/>
               </a:rPr>
-              <a:t>(Increase </a:t>
-            </a:r>
+              <a:t>High average </a:t>
+            </a:r>
+          </a:p>
+          <a:p>
+            <a:pPr algn="ctr">
+              <a:lnSpc>
+                <a:spcPct val="90000"/>
+              </a:lnSpc>
+            </a:pPr>
             <a:r>
               <a:rPr lang="en-US" sz="2400" dirty="0" smtClean="0">
                 <a:latin typeface="Avenir Heavy"/>
                 <a:cs typeface="Avenir Heavy"/>
               </a:rPr>
-              <a:t>your average </a:t>
-            </a:r>
-            <a:r>
-              <a:rPr lang="en-US" sz="2400" dirty="0" smtClean="0">
-                <a:latin typeface="Avenir Heavy"/>
-                <a:cs typeface="Avenir Heavy"/>
-              </a:rPr>
-              <a:t>domestic gross!)</a:t>
-            </a:r>
-            <a:endParaRPr lang="en-US" sz="2400" dirty="0" smtClean="0">
-              <a:latin typeface="Avenir Heavy"/>
-              <a:cs typeface="Avenir Heavy"/>
-            </a:endParaRPr>
+              <a:t>domestic gross</a:t>
+            </a:r>
+          </a:p>
+        </p:txBody>
+      </p:sp>
+      <p:sp>
+        <p:nvSpPr>
+          <p:cNvPr id="8" name="TextBox 7"/>
+          <p:cNvSpPr txBox="1"/>
+          <p:nvPr/>
+        </p:nvSpPr>
+        <p:spPr>
+          <a:xfrm>
+            <a:off x="298456" y="1416128"/>
+            <a:ext cx="4551403" cy="369332"/>
+          </a:xfrm>
+          <a:prstGeom prst="rect">
+            <a:avLst/>
+          </a:prstGeom>
+          <a:noFill/>
+        </p:spPr>
+        <p:txBody>
+          <a:bodyPr wrap="square" rtlCol="0">
+            <a:spAutoFit/>
+          </a:bodyPr>
+          <a:lstStyle/>
+          <a:p>
+            <a:endParaRPr lang="en-US" dirty="0"/>
           </a:p>
         </p:txBody>
       </p:sp>
@@ -6562,7 +7717,7 @@
 </p:sld>
 </file>
 
-<file path=ppt/slides/slide5.xml><?xml version="1.0" encoding="utf-8"?>
+<file path=ppt/slides/slide9.xml><?xml version="1.0" encoding="utf-8"?>
 <p:sld xmlns:a="http://schemas.openxmlformats.org/drawingml/2006/main" xmlns:r="http://schemas.openxmlformats.org/officeDocument/2006/relationships" xmlns:p="http://schemas.openxmlformats.org/presentationml/2006/main">
   <p:cSld>
     <p:spTree>
@@ -6581,7 +7736,7 @@
       </p:grpSpPr>
       <p:sp>
         <p:nvSpPr>
-          <p:cNvPr id="2" name="Title 1"/>
+          <p:cNvPr id="4" name="Title 1"/>
           <p:cNvSpPr>
             <a:spLocks noGrp="1"/>
           </p:cNvSpPr>
@@ -6591,566 +7746,276 @@
         </p:nvSpPr>
         <p:spPr>
           <a:xfrm>
-            <a:off x="457200" y="2623222"/>
+            <a:off x="102159" y="76664"/>
             <a:ext cx="8229600" cy="1143000"/>
           </a:xfrm>
         </p:spPr>
         <p:txBody>
-          <a:bodyPr>
-            <a:normAutofit fontScale="90000"/>
-          </a:bodyPr>
+          <a:bodyPr/>
           <a:lstStyle/>
           <a:p>
             <a:pPr algn="l"/>
             <a:r>
-              <a:rPr lang="en-US" sz="6000" b="1" dirty="0" smtClean="0">
-                <a:latin typeface="Avenir Black"/>
-                <a:cs typeface="Avenir Black"/>
+              <a:rPr lang="en-US" i="1" u="sng" dirty="0" smtClean="0">
+                <a:latin typeface="Avenir Heavy"/>
+                <a:cs typeface="Avenir Heavy"/>
               </a:rPr>
-              <a:t>Questions?</a:t>
-            </a:r>
-            <a:br>
-              <a:rPr lang="en-US" sz="6000" b="1" dirty="0" smtClean="0">
-                <a:latin typeface="Avenir Black"/>
-                <a:cs typeface="Avenir Black"/>
-              </a:rPr>
-            </a:br>
-            <a:r>
-              <a:rPr lang="en-US" sz="6000" b="1" dirty="0">
-                <a:latin typeface="Avenir Black"/>
-                <a:cs typeface="Avenir Black"/>
-              </a:rPr>
-              <a:t/>
-            </a:r>
-            <a:br>
-              <a:rPr lang="en-US" sz="6000" b="1" dirty="0">
-                <a:latin typeface="Avenir Black"/>
-                <a:cs typeface="Avenir Black"/>
-              </a:rPr>
-            </a:br>
-            <a:r>
-              <a:rPr lang="en-US" sz="6000" b="1" dirty="0" smtClean="0">
-                <a:latin typeface="Avenir Black"/>
-                <a:cs typeface="Avenir Black"/>
-              </a:rPr>
-              <a:t/>
-            </a:r>
-            <a:br>
-              <a:rPr lang="en-US" sz="6000" b="1" dirty="0" smtClean="0">
-                <a:latin typeface="Avenir Black"/>
-                <a:cs typeface="Avenir Black"/>
-              </a:rPr>
-            </a:br>
-            <a:r>
-              <a:rPr lang="en-US" sz="3600" b="1" dirty="0" smtClean="0">
-                <a:latin typeface="Avenir Book"/>
-                <a:cs typeface="Avenir Book"/>
-              </a:rPr>
-              <a:t>Laura Col</a:t>
-            </a:r>
-            <a:r>
-              <a:rPr lang="en-US" sz="3600" b="1" dirty="0" smtClean="0">
-                <a:latin typeface="Avenir Book"/>
-                <a:cs typeface="Avenir Book"/>
-              </a:rPr>
-              <a:t>ón-Meléndez</a:t>
-            </a:r>
-            <a:r>
-              <a:rPr lang="en-US" sz="3600" b="1" dirty="0" smtClean="0">
-                <a:latin typeface="Avenir Book"/>
-                <a:cs typeface="Avenir Book"/>
-              </a:rPr>
-              <a:t/>
-            </a:r>
-            <a:br>
-              <a:rPr lang="en-US" sz="3600" b="1" dirty="0" smtClean="0">
-                <a:latin typeface="Avenir Book"/>
-                <a:cs typeface="Avenir Book"/>
-              </a:rPr>
-            </a:br>
-            <a:r>
-              <a:rPr lang="en-US" sz="3600" b="1" dirty="0" err="1" smtClean="0">
-                <a:latin typeface="Avenir Book"/>
-                <a:cs typeface="Avenir Book"/>
-              </a:rPr>
-              <a:t>lauradelmar@gmail.com</a:t>
-            </a:r>
-            <a:endParaRPr lang="en-US" sz="3600" b="1" dirty="0">
-              <a:latin typeface="Avenir Book"/>
-              <a:cs typeface="Avenir Book"/>
+              <a:t>What’s next</a:t>
+            </a:r>
+            <a:endParaRPr lang="en-US" i="1" u="sng" dirty="0">
+              <a:latin typeface="Avenir Heavy"/>
+              <a:cs typeface="Avenir Heavy"/>
             </a:endParaRPr>
           </a:p>
         </p:txBody>
       </p:sp>
       <p:sp>
         <p:nvSpPr>
-          <p:cNvPr id="3" name="TextBox 2"/>
-          <p:cNvSpPr txBox="1"/>
+          <p:cNvPr id="5" name="Content Placeholder 2"/>
+          <p:cNvSpPr txBox="1">
+            <a:spLocks/>
+          </p:cNvSpPr>
           <p:nvPr/>
         </p:nvSpPr>
         <p:spPr>
           <a:xfrm>
-            <a:off x="4598459" y="3241035"/>
-            <a:ext cx="184666" cy="369332"/>
+            <a:off x="978158" y="1591318"/>
+            <a:ext cx="7353601" cy="3868803"/>
           </a:xfrm>
           <a:prstGeom prst="rect">
             <a:avLst/>
           </a:prstGeom>
-          <a:noFill/>
+          <a:ln w="63500">
+            <a:solidFill>
+              <a:schemeClr val="accent4">
+                <a:lumMod val="60000"/>
+                <a:lumOff val="40000"/>
+              </a:schemeClr>
+            </a:solidFill>
+            <a:prstDash val="dash"/>
+          </a:ln>
         </p:spPr>
         <p:txBody>
-          <a:bodyPr wrap="none" rtlCol="0">
-            <a:spAutoFit/>
+          <a:bodyPr vert="horz" lIns="91440" tIns="45720" rIns="91440" bIns="45720" rtlCol="0" anchor="ctr">
+            <a:noAutofit/>
           </a:bodyPr>
-          <a:lstStyle/>
-          <a:p>
-            <a:endParaRPr lang="en-US" dirty="0"/>
+          <a:lstStyle>
+            <a:lvl1pPr marL="342900" indent="-342900" algn="l" defTabSz="457200" rtl="0" eaLnBrk="1" latinLnBrk="0" hangingPunct="1">
+              <a:spcBef>
+                <a:spcPct val="20000"/>
+              </a:spcBef>
+              <a:buFont typeface="Arial"/>
+              <a:buChar char="•"/>
+              <a:defRPr sz="3200" kern="1200">
+                <a:solidFill>
+                  <a:schemeClr val="tx1"/>
+                </a:solidFill>
+                <a:latin typeface="+mn-lt"/>
+                <a:ea typeface="+mn-ea"/>
+                <a:cs typeface="+mn-cs"/>
+              </a:defRPr>
+            </a:lvl1pPr>
+            <a:lvl2pPr marL="742950" indent="-285750" algn="l" defTabSz="457200" rtl="0" eaLnBrk="1" latinLnBrk="0" hangingPunct="1">
+              <a:spcBef>
+                <a:spcPct val="20000"/>
+              </a:spcBef>
+              <a:buFont typeface="Arial"/>
+              <a:buChar char="–"/>
+              <a:defRPr sz="2800" kern="1200">
+                <a:solidFill>
+                  <a:schemeClr val="tx1"/>
+                </a:solidFill>
+                <a:latin typeface="+mn-lt"/>
+                <a:ea typeface="+mn-ea"/>
+                <a:cs typeface="+mn-cs"/>
+              </a:defRPr>
+            </a:lvl2pPr>
+            <a:lvl3pPr marL="1143000" indent="-228600" algn="l" defTabSz="457200" rtl="0" eaLnBrk="1" latinLnBrk="0" hangingPunct="1">
+              <a:spcBef>
+                <a:spcPct val="20000"/>
+              </a:spcBef>
+              <a:buFont typeface="Arial"/>
+              <a:buChar char="•"/>
+              <a:defRPr sz="2400" kern="1200">
+                <a:solidFill>
+                  <a:schemeClr val="tx1"/>
+                </a:solidFill>
+                <a:latin typeface="+mn-lt"/>
+                <a:ea typeface="+mn-ea"/>
+                <a:cs typeface="+mn-cs"/>
+              </a:defRPr>
+            </a:lvl3pPr>
+            <a:lvl4pPr marL="1600200" indent="-228600" algn="l" defTabSz="457200" rtl="0" eaLnBrk="1" latinLnBrk="0" hangingPunct="1">
+              <a:spcBef>
+                <a:spcPct val="20000"/>
+              </a:spcBef>
+              <a:buFont typeface="Arial"/>
+              <a:buChar char="–"/>
+              <a:defRPr sz="2000" kern="1200">
+                <a:solidFill>
+                  <a:schemeClr val="tx1"/>
+                </a:solidFill>
+                <a:latin typeface="+mn-lt"/>
+                <a:ea typeface="+mn-ea"/>
+                <a:cs typeface="+mn-cs"/>
+              </a:defRPr>
+            </a:lvl4pPr>
+            <a:lvl5pPr marL="2057400" indent="-228600" algn="l" defTabSz="457200" rtl="0" eaLnBrk="1" latinLnBrk="0" hangingPunct="1">
+              <a:spcBef>
+                <a:spcPct val="20000"/>
+              </a:spcBef>
+              <a:buFont typeface="Arial"/>
+              <a:buChar char="»"/>
+              <a:defRPr sz="2000" kern="1200">
+                <a:solidFill>
+                  <a:schemeClr val="tx1"/>
+                </a:solidFill>
+                <a:latin typeface="+mn-lt"/>
+                <a:ea typeface="+mn-ea"/>
+                <a:cs typeface="+mn-cs"/>
+              </a:defRPr>
+            </a:lvl5pPr>
+            <a:lvl6pPr marL="2514600" indent="-228600" algn="l" defTabSz="457200" rtl="0" eaLnBrk="1" latinLnBrk="0" hangingPunct="1">
+              <a:spcBef>
+                <a:spcPct val="20000"/>
+              </a:spcBef>
+              <a:buFont typeface="Arial"/>
+              <a:buChar char="•"/>
+              <a:defRPr sz="2000" kern="1200">
+                <a:solidFill>
+                  <a:schemeClr val="tx1"/>
+                </a:solidFill>
+                <a:latin typeface="+mn-lt"/>
+                <a:ea typeface="+mn-ea"/>
+                <a:cs typeface="+mn-cs"/>
+              </a:defRPr>
+            </a:lvl6pPr>
+            <a:lvl7pPr marL="2971800" indent="-228600" algn="l" defTabSz="457200" rtl="0" eaLnBrk="1" latinLnBrk="0" hangingPunct="1">
+              <a:spcBef>
+                <a:spcPct val="20000"/>
+              </a:spcBef>
+              <a:buFont typeface="Arial"/>
+              <a:buChar char="•"/>
+              <a:defRPr sz="2000" kern="1200">
+                <a:solidFill>
+                  <a:schemeClr val="tx1"/>
+                </a:solidFill>
+                <a:latin typeface="+mn-lt"/>
+                <a:ea typeface="+mn-ea"/>
+                <a:cs typeface="+mn-cs"/>
+              </a:defRPr>
+            </a:lvl7pPr>
+            <a:lvl8pPr marL="3429000" indent="-228600" algn="l" defTabSz="457200" rtl="0" eaLnBrk="1" latinLnBrk="0" hangingPunct="1">
+              <a:spcBef>
+                <a:spcPct val="20000"/>
+              </a:spcBef>
+              <a:buFont typeface="Arial"/>
+              <a:buChar char="•"/>
+              <a:defRPr sz="2000" kern="1200">
+                <a:solidFill>
+                  <a:schemeClr val="tx1"/>
+                </a:solidFill>
+                <a:latin typeface="+mn-lt"/>
+                <a:ea typeface="+mn-ea"/>
+                <a:cs typeface="+mn-cs"/>
+              </a:defRPr>
+            </a:lvl8pPr>
+            <a:lvl9pPr marL="3886200" indent="-228600" algn="l" defTabSz="457200" rtl="0" eaLnBrk="1" latinLnBrk="0" hangingPunct="1">
+              <a:spcBef>
+                <a:spcPct val="20000"/>
+              </a:spcBef>
+              <a:buFont typeface="Arial"/>
+              <a:buChar char="•"/>
+              <a:defRPr sz="2000" kern="1200">
+                <a:solidFill>
+                  <a:schemeClr val="tx1"/>
+                </a:solidFill>
+                <a:latin typeface="+mn-lt"/>
+                <a:ea typeface="+mn-ea"/>
+                <a:cs typeface="+mn-cs"/>
+              </a:defRPr>
+            </a:lvl9pPr>
+          </a:lstStyle>
+          <a:p>
+            <a:pPr>
+              <a:lnSpc>
+                <a:spcPct val="90000"/>
+              </a:lnSpc>
+              <a:buFontTx/>
+              <a:buChar char="•"/>
+            </a:pPr>
+            <a:r>
+              <a:rPr lang="en-US" sz="3600" dirty="0" smtClean="0">
+                <a:latin typeface="Avenir Heavy"/>
+                <a:cs typeface="Avenir Heavy"/>
+              </a:rPr>
+              <a:t>Clean the data further!</a:t>
+            </a:r>
+          </a:p>
+          <a:p>
+            <a:pPr lvl="1">
+              <a:lnSpc>
+                <a:spcPct val="90000"/>
+              </a:lnSpc>
+              <a:buFontTx/>
+              <a:buChar char="•"/>
+            </a:pPr>
+            <a:r>
+              <a:rPr lang="en-US" dirty="0" smtClean="0">
+                <a:latin typeface="Avenir Heavy"/>
+                <a:cs typeface="Avenir Heavy"/>
+              </a:rPr>
+              <a:t>Get rid of actors with few movies</a:t>
+            </a:r>
+          </a:p>
+          <a:p>
+            <a:pPr lvl="1">
+              <a:lnSpc>
+                <a:spcPct val="90000"/>
+              </a:lnSpc>
+              <a:buFontTx/>
+              <a:buChar char="•"/>
+            </a:pPr>
+            <a:r>
+              <a:rPr lang="en-US" dirty="0" smtClean="0">
+                <a:latin typeface="Avenir Heavy"/>
+                <a:cs typeface="Avenir Heavy"/>
+              </a:rPr>
+              <a:t>Consider directors and distributors</a:t>
+            </a:r>
+            <a:br>
+              <a:rPr lang="en-US" dirty="0" smtClean="0">
+                <a:latin typeface="Avenir Heavy"/>
+                <a:cs typeface="Avenir Heavy"/>
+              </a:rPr>
+            </a:br>
+            <a:endParaRPr lang="en-US" dirty="0" smtClean="0">
+              <a:latin typeface="Avenir Heavy"/>
+              <a:cs typeface="Avenir Heavy"/>
+            </a:endParaRPr>
+          </a:p>
+          <a:p>
+            <a:pPr>
+              <a:lnSpc>
+                <a:spcPct val="90000"/>
+              </a:lnSpc>
+              <a:buFontTx/>
+              <a:buChar char="•"/>
+            </a:pPr>
+            <a:r>
+              <a:rPr lang="en-US" dirty="0" smtClean="0">
+                <a:latin typeface="Avenir Heavy"/>
+                <a:cs typeface="Avenir Heavy"/>
+              </a:rPr>
+              <a:t>Find additional sources of data</a:t>
+            </a:r>
           </a:p>
         </p:txBody>
       </p:sp>
     </p:spTree>
     <p:extLst>
       <p:ext uri="{BB962C8B-B14F-4D97-AF65-F5344CB8AC3E}">
-        <p14:creationId xmlns:p14="http://schemas.microsoft.com/office/powerpoint/2010/main" val="2208354849"/>
-      </p:ext>
-    </p:extLst>
-  </p:cSld>
-  <p:clrMapOvr>
-    <a:masterClrMapping/>
-  </p:clrMapOvr>
-  <p:timing>
-    <p:tnLst>
-      <p:par>
-        <p:cTn xmlns:p14="http://schemas.microsoft.com/office/powerpoint/2010/main" id="1" dur="indefinite" restart="never" nodeType="tmRoot"/>
-      </p:par>
-    </p:tnLst>
-  </p:timing>
-</p:sld>
-</file>
-
-<file path=ppt/slides/slide6.xml><?xml version="1.0" encoding="utf-8"?>
-<p:sld xmlns:a="http://schemas.openxmlformats.org/drawingml/2006/main" xmlns:r="http://schemas.openxmlformats.org/officeDocument/2006/relationships" xmlns:p="http://schemas.openxmlformats.org/presentationml/2006/main">
-  <p:cSld>
-    <p:spTree>
-      <p:nvGrpSpPr>
-        <p:cNvPr id="1" name=""/>
-        <p:cNvGrpSpPr/>
-        <p:nvPr/>
-      </p:nvGrpSpPr>
-      <p:grpSpPr>
-        <a:xfrm>
-          <a:off x="0" y="0"/>
-          <a:ext cx="0" cy="0"/>
-          <a:chOff x="0" y="0"/>
-          <a:chExt cx="0" cy="0"/>
-        </a:xfrm>
-      </p:grpSpPr>
-      <p:sp>
-        <p:nvSpPr>
-          <p:cNvPr id="2" name="Title 1"/>
-          <p:cNvSpPr>
-            <a:spLocks noGrp="1"/>
-          </p:cNvSpPr>
-          <p:nvPr>
-            <p:ph type="title"/>
-          </p:nvPr>
-        </p:nvSpPr>
-        <p:spPr>
-          <a:xfrm>
-            <a:off x="457200" y="2623222"/>
-            <a:ext cx="8229600" cy="1143000"/>
-          </a:xfrm>
-        </p:spPr>
-        <p:txBody>
-          <a:bodyPr>
-            <a:normAutofit/>
-          </a:bodyPr>
-          <a:lstStyle/>
-          <a:p>
-            <a:r>
-              <a:rPr lang="en-US" sz="6000" b="1" dirty="0" smtClean="0">
-                <a:latin typeface="Avenir Black"/>
-                <a:cs typeface="Avenir Black"/>
-              </a:rPr>
-              <a:t>PLOTS</a:t>
-            </a:r>
-            <a:endParaRPr lang="en-US" sz="6000" b="1" dirty="0">
-              <a:latin typeface="Avenir Black"/>
-              <a:cs typeface="Avenir Black"/>
-            </a:endParaRPr>
-          </a:p>
-        </p:txBody>
-      </p:sp>
-    </p:spTree>
-    <p:extLst>
-      <p:ext uri="{BB962C8B-B14F-4D97-AF65-F5344CB8AC3E}">
-        <p14:creationId xmlns:p14="http://schemas.microsoft.com/office/powerpoint/2010/main" val="4142937862"/>
-      </p:ext>
-    </p:extLst>
-  </p:cSld>
-  <p:clrMapOvr>
-    <a:masterClrMapping/>
-  </p:clrMapOvr>
-  <p:timing>
-    <p:tnLst>
-      <p:par>
-        <p:cTn xmlns:p14="http://schemas.microsoft.com/office/powerpoint/2010/main" id="1" dur="indefinite" restart="never" nodeType="tmRoot"/>
-      </p:par>
-    </p:tnLst>
-  </p:timing>
-</p:sld>
-</file>
-
-<file path=ppt/slides/slide7.xml><?xml version="1.0" encoding="utf-8"?>
-<p:sld xmlns:a="http://schemas.openxmlformats.org/drawingml/2006/main" xmlns:r="http://schemas.openxmlformats.org/officeDocument/2006/relationships" xmlns:p="http://schemas.openxmlformats.org/presentationml/2006/main">
-  <p:cSld>
-    <p:spTree>
-      <p:nvGrpSpPr>
-        <p:cNvPr id="1" name=""/>
-        <p:cNvGrpSpPr/>
-        <p:nvPr/>
-      </p:nvGrpSpPr>
-      <p:grpSpPr>
-        <a:xfrm>
-          <a:off x="0" y="0"/>
-          <a:ext cx="0" cy="0"/>
-          <a:chOff x="0" y="0"/>
-          <a:chExt cx="0" cy="0"/>
-        </a:xfrm>
-      </p:grpSpPr>
-      <p:pic>
-        <p:nvPicPr>
-          <p:cNvPr id="7" name="Picture 6" descr="JcbNe2mSrRUAAAAASUVORK5CYII=.png"/>
-          <p:cNvPicPr>
-            <a:picLocks noChangeAspect="1"/>
-          </p:cNvPicPr>
-          <p:nvPr/>
-        </p:nvPicPr>
-        <p:blipFill>
-          <a:blip r:embed="rId3">
-            <a:extLst>
-              <a:ext uri="{28A0092B-C50C-407E-A947-70E740481C1C}">
-                <a14:useLocalDpi xmlns:a14="http://schemas.microsoft.com/office/drawing/2010/main" val="0"/>
-              </a:ext>
-            </a:extLst>
-          </a:blip>
-          <a:stretch>
-            <a:fillRect/>
-          </a:stretch>
-        </p:blipFill>
-        <p:spPr>
-          <a:xfrm>
-            <a:off x="453990" y="930764"/>
-            <a:ext cx="8311444" cy="5805481"/>
-          </a:xfrm>
-          <a:prstGeom prst="rect">
-            <a:avLst/>
-          </a:prstGeom>
-        </p:spPr>
-      </p:pic>
-      <p:sp>
-        <p:nvSpPr>
-          <p:cNvPr id="8" name="TextBox 7"/>
-          <p:cNvSpPr txBox="1"/>
-          <p:nvPr/>
-        </p:nvSpPr>
-        <p:spPr>
-          <a:xfrm>
-            <a:off x="598530" y="196943"/>
-            <a:ext cx="8093913" cy="646331"/>
-          </a:xfrm>
-          <a:prstGeom prst="rect">
-            <a:avLst/>
-          </a:prstGeom>
-          <a:noFill/>
-          <a:ln w="63500">
-            <a:solidFill>
-              <a:srgbClr val="FF0000"/>
-            </a:solidFill>
-          </a:ln>
-        </p:spPr>
-        <p:txBody>
-          <a:bodyPr wrap="square" rtlCol="0">
-            <a:spAutoFit/>
-          </a:bodyPr>
-          <a:lstStyle/>
-          <a:p>
-            <a:pPr algn="ctr"/>
-            <a:r>
-              <a:rPr lang="en-US" dirty="0" smtClean="0">
-                <a:latin typeface="Avenir Book"/>
-                <a:cs typeface="Avenir Book"/>
-              </a:rPr>
-              <a:t>Lots of budget information was missing, so I used domestic gross </a:t>
-            </a:r>
-            <a:r>
-              <a:rPr lang="en-US" dirty="0" smtClean="0">
-                <a:latin typeface="Avenir Book"/>
-                <a:cs typeface="Avenir Book"/>
-              </a:rPr>
-              <a:t>instead; measured an actor’s average movie domestic gross</a:t>
-            </a:r>
-            <a:endParaRPr lang="en-US" dirty="0">
-              <a:latin typeface="Avenir Book"/>
-              <a:cs typeface="Avenir Book"/>
-            </a:endParaRPr>
-          </a:p>
-        </p:txBody>
-      </p:sp>
-    </p:spTree>
-    <p:extLst>
-      <p:ext uri="{BB962C8B-B14F-4D97-AF65-F5344CB8AC3E}">
-        <p14:creationId xmlns:p14="http://schemas.microsoft.com/office/powerpoint/2010/main" val="1726886620"/>
-      </p:ext>
-    </p:extLst>
-  </p:cSld>
-  <p:clrMapOvr>
-    <a:masterClrMapping/>
-  </p:clrMapOvr>
-  <p:timing>
-    <p:tnLst>
-      <p:par>
-        <p:cTn xmlns:p14="http://schemas.microsoft.com/office/powerpoint/2010/main" id="1" dur="indefinite" restart="never" nodeType="tmRoot"/>
-      </p:par>
-    </p:tnLst>
-  </p:timing>
-</p:sld>
-</file>
-
-<file path=ppt/slides/slide8.xml><?xml version="1.0" encoding="utf-8"?>
-<p:sld xmlns:a="http://schemas.openxmlformats.org/drawingml/2006/main" xmlns:r="http://schemas.openxmlformats.org/officeDocument/2006/relationships" xmlns:p="http://schemas.openxmlformats.org/presentationml/2006/main">
-  <p:cSld>
-    <p:spTree>
-      <p:nvGrpSpPr>
-        <p:cNvPr id="1" name=""/>
-        <p:cNvGrpSpPr/>
-        <p:nvPr/>
-      </p:nvGrpSpPr>
-      <p:grpSpPr>
-        <a:xfrm>
-          <a:off x="0" y="0"/>
-          <a:ext cx="0" cy="0"/>
-          <a:chOff x="0" y="0"/>
-          <a:chExt cx="0" cy="0"/>
-        </a:xfrm>
-      </p:grpSpPr>
-      <p:pic>
-        <p:nvPicPr>
-          <p:cNvPr id="4" name="Picture 3" descr="P5etoW1AmQp3TnA0vzNT0g6T7SQ1KHRsRjpAB7iqSX+rgWY1yCzRjTOvLTvJ2SLmq1FmPq4JGpMcYYUxOPTI0xxpiaeGRqjDHG1MTB1BhjjKmJg6kxxhhTEwdTY4wxpiYOpsYYY0xNHEyNMcaYmvwf5K9z51moQsYAAAAASUVORK5CYII=.png"/>
-          <p:cNvPicPr>
-            <a:picLocks noChangeAspect="1"/>
-          </p:cNvPicPr>
-          <p:nvPr/>
-        </p:nvPicPr>
-        <p:blipFill>
-          <a:blip r:embed="rId2">
-            <a:extLst>
-              <a:ext uri="{28A0092B-C50C-407E-A947-70E740481C1C}">
-                <a14:useLocalDpi xmlns:a14="http://schemas.microsoft.com/office/drawing/2010/main" val="0"/>
-              </a:ext>
-            </a:extLst>
-          </a:blip>
-          <a:stretch>
-            <a:fillRect/>
-          </a:stretch>
-        </p:blipFill>
-        <p:spPr>
-          <a:xfrm>
-            <a:off x="122895" y="154367"/>
-            <a:ext cx="8936682" cy="5147682"/>
-          </a:xfrm>
-          <a:prstGeom prst="rect">
-            <a:avLst/>
-          </a:prstGeom>
-        </p:spPr>
-      </p:pic>
-      <p:sp>
-        <p:nvSpPr>
-          <p:cNvPr id="5" name="Rectangle 4"/>
-          <p:cNvSpPr/>
-          <p:nvPr/>
-        </p:nvSpPr>
-        <p:spPr>
-          <a:xfrm>
-            <a:off x="616784" y="633232"/>
-            <a:ext cx="1594555" cy="592667"/>
-          </a:xfrm>
-          <a:prstGeom prst="rect">
-            <a:avLst/>
-          </a:prstGeom>
-          <a:noFill/>
-          <a:ln w="38100">
-            <a:solidFill>
-              <a:srgbClr val="FF0000"/>
-            </a:solidFill>
-          </a:ln>
-          <a:effectLst/>
-        </p:spPr>
-        <p:style>
-          <a:lnRef idx="1">
-            <a:schemeClr val="accent1"/>
-          </a:lnRef>
-          <a:fillRef idx="3">
-            <a:schemeClr val="accent1"/>
-          </a:fillRef>
-          <a:effectRef idx="2">
-            <a:schemeClr val="accent1"/>
-          </a:effectRef>
-          <a:fontRef idx="minor">
-            <a:schemeClr val="lt1"/>
-          </a:fontRef>
-        </p:style>
-        <p:txBody>
-          <a:bodyPr rtlCol="0" anchor="ctr"/>
-          <a:lstStyle/>
-          <a:p>
-            <a:pPr algn="ctr"/>
-            <a:endParaRPr lang="en-US"/>
-          </a:p>
-        </p:txBody>
-      </p:sp>
-      <p:sp>
-        <p:nvSpPr>
-          <p:cNvPr id="6" name="Title 1"/>
-          <p:cNvSpPr txBox="1">
-            <a:spLocks/>
-          </p:cNvSpPr>
-          <p:nvPr/>
-        </p:nvSpPr>
-        <p:spPr>
-          <a:xfrm>
-            <a:off x="593970" y="5260742"/>
-            <a:ext cx="8229600" cy="1143000"/>
-          </a:xfrm>
-          <a:prstGeom prst="rect">
-            <a:avLst/>
-          </a:prstGeom>
-          <a:solidFill>
-            <a:schemeClr val="accent6">
-              <a:lumMod val="20000"/>
-              <a:lumOff val="80000"/>
-            </a:schemeClr>
-          </a:solidFill>
-        </p:spPr>
-        <p:txBody>
-          <a:bodyPr vert="horz" lIns="91440" tIns="45720" rIns="91440" bIns="45720" rtlCol="0" anchor="ctr">
-            <a:normAutofit/>
-          </a:bodyPr>
-          <a:lstStyle>
-            <a:lvl1pPr algn="ctr" defTabSz="457200" rtl="0" eaLnBrk="1" latinLnBrk="0" hangingPunct="1">
-              <a:spcBef>
-                <a:spcPct val="0"/>
-              </a:spcBef>
-              <a:buNone/>
-              <a:defRPr sz="4400" kern="1200">
-                <a:solidFill>
-                  <a:schemeClr val="tx1"/>
-                </a:solidFill>
-                <a:latin typeface="+mj-lt"/>
-                <a:ea typeface="+mj-ea"/>
-                <a:cs typeface="+mj-cs"/>
-              </a:defRPr>
-            </a:lvl1pPr>
-          </a:lstStyle>
-          <a:p>
-            <a:r>
-              <a:rPr lang="en-US" sz="3200" dirty="0" smtClean="0">
-                <a:solidFill>
-                  <a:srgbClr val="660066"/>
-                </a:solidFill>
-                <a:latin typeface="Avenir Black"/>
-                <a:cs typeface="Avenir Black"/>
-              </a:rPr>
-              <a:t>Gradient Boosted Regression Tree model</a:t>
-            </a:r>
-          </a:p>
-          <a:p>
-            <a:r>
-              <a:rPr lang="en-US" sz="2000" dirty="0" smtClean="0">
-                <a:solidFill>
-                  <a:srgbClr val="660066"/>
-                </a:solidFill>
-                <a:latin typeface="Avenir Black"/>
-                <a:cs typeface="Avenir Black"/>
-              </a:rPr>
-              <a:t>Score: ~0.87</a:t>
-            </a:r>
-          </a:p>
-        </p:txBody>
-      </p:sp>
-      <p:sp>
-        <p:nvSpPr>
-          <p:cNvPr id="7" name="TextBox 6"/>
-          <p:cNvSpPr txBox="1"/>
-          <p:nvPr/>
-        </p:nvSpPr>
-        <p:spPr>
-          <a:xfrm>
-            <a:off x="1037807" y="6403742"/>
-            <a:ext cx="7728958" cy="461665"/>
-          </a:xfrm>
-          <a:prstGeom prst="rect">
-            <a:avLst/>
-          </a:prstGeom>
-          <a:noFill/>
-        </p:spPr>
-        <p:txBody>
-          <a:bodyPr wrap="square" rtlCol="0">
-            <a:spAutoFit/>
-          </a:bodyPr>
-          <a:lstStyle/>
-          <a:p>
-            <a:r>
-              <a:rPr lang="en-US" sz="2400" dirty="0" smtClean="0">
-                <a:latin typeface="Avenir Book"/>
-                <a:cs typeface="Avenir Book"/>
-              </a:rPr>
-              <a:t>Selected features that did better than random noise!</a:t>
-            </a:r>
-            <a:endParaRPr lang="en-US" sz="2400" dirty="0">
-              <a:latin typeface="Avenir Book"/>
-              <a:cs typeface="Avenir Book"/>
-            </a:endParaRPr>
-          </a:p>
-        </p:txBody>
-      </p:sp>
-      <p:cxnSp>
-        <p:nvCxnSpPr>
-          <p:cNvPr id="9" name="Straight Arrow Connector 8"/>
-          <p:cNvCxnSpPr/>
-          <p:nvPr/>
-        </p:nvCxnSpPr>
-        <p:spPr>
-          <a:xfrm flipV="1">
-            <a:off x="4902286" y="928499"/>
-            <a:ext cx="737392" cy="4765438"/>
-          </a:xfrm>
-          <a:prstGeom prst="straightConnector1">
-            <a:avLst/>
-          </a:prstGeom>
-          <a:ln>
-            <a:tailEnd type="arrow"/>
-          </a:ln>
-        </p:spPr>
-        <p:style>
-          <a:lnRef idx="2">
-            <a:schemeClr val="accent1"/>
-          </a:lnRef>
-          <a:fillRef idx="0">
-            <a:schemeClr val="accent1"/>
-          </a:fillRef>
-          <a:effectRef idx="1">
-            <a:schemeClr val="accent1"/>
-          </a:effectRef>
-          <a:fontRef idx="minor">
-            <a:schemeClr val="tx1"/>
-          </a:fontRef>
-        </p:style>
-      </p:cxnSp>
-    </p:spTree>
-    <p:extLst>
-      <p:ext uri="{BB962C8B-B14F-4D97-AF65-F5344CB8AC3E}">
-        <p14:creationId xmlns:p14="http://schemas.microsoft.com/office/powerpoint/2010/main" val="40171864"/>
+        <p14:creationId xmlns:p14="http://schemas.microsoft.com/office/powerpoint/2010/main" val="4216873704"/>
       </p:ext>
     </p:extLst>
   </p:cSld>
@@ -7191,79 +8056,7 @@
                                           </p:stCondLst>
                                         </p:cTn>
                                         <p:tgtEl>
-                                          <p:spTgt spid="6"/>
-                                        </p:tgtEl>
-                                        <p:attrNameLst>
-                                          <p:attrName>style.visibility</p:attrName>
-                                        </p:attrNameLst>
-                                      </p:cBhvr>
-                                      <p:to>
-                                        <p:strVal val="visible"/>
-                                      </p:to>
-                                    </p:set>
-                                  </p:childTnLst>
-                                </p:cTn>
-                              </p:par>
-                            </p:childTnLst>
-                          </p:cTn>
-                        </p:par>
-                      </p:childTnLst>
-                    </p:cTn>
-                  </p:par>
-                  <p:par>
-                    <p:cTn id="7" fill="hold">
-                      <p:stCondLst>
-                        <p:cond delay="indefinite"/>
-                      </p:stCondLst>
-                      <p:childTnLst>
-                        <p:par>
-                          <p:cTn id="8" fill="hold">
-                            <p:stCondLst>
-                              <p:cond delay="0"/>
-                            </p:stCondLst>
-                            <p:childTnLst>
-                              <p:par>
-                                <p:cTn id="9" presetID="1" presetClass="entr" presetSubtype="0" fill="hold" grpId="0" nodeType="clickEffect">
-                                  <p:stCondLst>
-                                    <p:cond delay="0"/>
-                                  </p:stCondLst>
-                                  <p:childTnLst>
-                                    <p:set>
-                                      <p:cBhvr>
-                                        <p:cTn id="10" dur="1" fill="hold">
-                                          <p:stCondLst>
-                                            <p:cond delay="0"/>
-                                          </p:stCondLst>
-                                        </p:cTn>
-                                        <p:tgtEl>
                                           <p:spTgt spid="5"/>
-                                        </p:tgtEl>
-                                        <p:attrNameLst>
-                                          <p:attrName>style.visibility</p:attrName>
-                                        </p:attrNameLst>
-                                      </p:cBhvr>
-                                      <p:to>
-                                        <p:strVal val="visible"/>
-                                      </p:to>
-                                    </p:set>
-                                  </p:childTnLst>
-                                </p:cTn>
-                              </p:par>
-                              <p:par>
-                                <p:cTn id="11" presetID="1" presetClass="entr" presetSubtype="0" fill="hold" grpId="0" nodeType="withEffect">
-                                  <p:stCondLst>
-                                    <p:cond delay="0"/>
-                                  </p:stCondLst>
-                                  <p:childTnLst>
-                                    <p:set>
-                                      <p:cBhvr>
-                                        <p:cTn id="12" dur="1" fill="hold">
-                                          <p:stCondLst>
-                                            <p:cond delay="0"/>
-                                          </p:stCondLst>
-                                        </p:cTn>
-                                        <p:tgtEl>
-                                          <p:spTgt spid="7"/>
                                         </p:tgtEl>
                                         <p:attrNameLst>
                                           <p:attrName>style.visibility</p:attrName>
@@ -7305,112 +8098,7 @@
     </p:tnLst>
     <p:bldLst>
       <p:bldP spid="5" grpId="0" animBg="1"/>
-      <p:bldP spid="6" grpId="0" animBg="1"/>
-      <p:bldP spid="7" grpId="0"/>
     </p:bldLst>
-  </p:timing>
-</p:sld>
-</file>
-
-<file path=ppt/slides/slide9.xml><?xml version="1.0" encoding="utf-8"?>
-<p:sld xmlns:a="http://schemas.openxmlformats.org/drawingml/2006/main" xmlns:r="http://schemas.openxmlformats.org/officeDocument/2006/relationships" xmlns:p="http://schemas.openxmlformats.org/presentationml/2006/main">
-  <p:cSld>
-    <p:spTree>
-      <p:nvGrpSpPr>
-        <p:cNvPr id="1" name=""/>
-        <p:cNvGrpSpPr/>
-        <p:nvPr/>
-      </p:nvGrpSpPr>
-      <p:grpSpPr>
-        <a:xfrm>
-          <a:off x="0" y="0"/>
-          <a:ext cx="0" cy="0"/>
-          <a:chOff x="0" y="0"/>
-          <a:chExt cx="0" cy="0"/>
-        </a:xfrm>
-      </p:grpSpPr>
-      <p:sp>
-        <p:nvSpPr>
-          <p:cNvPr id="5" name="TextBox 4"/>
-          <p:cNvSpPr txBox="1"/>
-          <p:nvPr/>
-        </p:nvSpPr>
-        <p:spPr>
-          <a:xfrm>
-            <a:off x="300418" y="273091"/>
-            <a:ext cx="7087156" cy="646331"/>
-          </a:xfrm>
-          <a:prstGeom prst="rect">
-            <a:avLst/>
-          </a:prstGeom>
-          <a:noFill/>
-        </p:spPr>
-        <p:txBody>
-          <a:bodyPr wrap="square" rtlCol="0">
-            <a:spAutoFit/>
-          </a:bodyPr>
-          <a:lstStyle/>
-          <a:p>
-            <a:r>
-              <a:rPr lang="en-US" sz="3600" dirty="0" smtClean="0">
-                <a:latin typeface="Avenir Black"/>
-                <a:cs typeface="Avenir Black"/>
-              </a:rPr>
-              <a:t>AVG DOMESTIC GROSS</a:t>
-            </a:r>
-            <a:endParaRPr lang="en-US" sz="3600" dirty="0">
-              <a:latin typeface="Avenir Black"/>
-              <a:cs typeface="Avenir Black"/>
-            </a:endParaRPr>
-          </a:p>
-        </p:txBody>
-      </p:sp>
-      <p:pic>
-        <p:nvPicPr>
-          <p:cNvPr id="2" name="Picture 1" descr="widest-release_domestic-gross.png"/>
-          <p:cNvPicPr>
-            <a:picLocks noChangeAspect="1"/>
-          </p:cNvPicPr>
-          <p:nvPr/>
-        </p:nvPicPr>
-        <p:blipFill>
-          <a:blip r:embed="rId3">
-            <a:extLst>
-              <a:ext uri="{28A0092B-C50C-407E-A947-70E740481C1C}">
-                <a14:useLocalDpi xmlns:a14="http://schemas.microsoft.com/office/drawing/2010/main" val="0"/>
-              </a:ext>
-            </a:extLst>
-          </a:blip>
-          <a:stretch>
-            <a:fillRect/>
-          </a:stretch>
-        </p:blipFill>
-        <p:spPr>
-          <a:xfrm>
-            <a:off x="1942848" y="979615"/>
-            <a:ext cx="5486400" cy="5486400"/>
-          </a:xfrm>
-          <a:prstGeom prst="rect">
-            <a:avLst/>
-          </a:prstGeom>
-        </p:spPr>
-      </p:pic>
-    </p:spTree>
-    <p:extLst>
-      <p:ext uri="{BB962C8B-B14F-4D97-AF65-F5344CB8AC3E}">
-        <p14:creationId xmlns:p14="http://schemas.microsoft.com/office/powerpoint/2010/main" val="2290044835"/>
-      </p:ext>
-    </p:extLst>
-  </p:cSld>
-  <p:clrMapOvr>
-    <a:masterClrMapping/>
-  </p:clrMapOvr>
-  <p:timing>
-    <p:tnLst>
-      <p:par>
-        <p:cTn xmlns:p14="http://schemas.microsoft.com/office/powerpoint/2010/main" id="1" dur="indefinite" restart="never" nodeType="tmRoot"/>
-      </p:par>
-    </p:tnLst>
   </p:timing>
 </p:sld>
 </file>

</xml_diff>